<commit_message>
updating for ct optional
</commit_message>
<xml_diff>
--- a/aws_sra_examples/solutions/s3/s3_block_account_public_access/documentation/s3-block-account-public-access.pptx
+++ b/aws_sra_examples/solutions/s3/s3_block_account_public_access/documentation/s3-block-account-public-access.pptx
@@ -8,7 +8,7 @@
     <p:notesMasterId r:id="rId3"/>
   </p:notesMasterIdLst>
   <p:sldIdLst>
-    <p:sldId id="256" r:id="rId2"/>
+    <p:sldId id="258" r:id="rId2"/>
   </p:sldIdLst>
   <p:sldSz cx="12192000" cy="6858000"/>
   <p:notesSz cx="6858000" cy="9144000"/>
@@ -197,7 +197,7 @@
           <a:p>
             <a:fld id="{FD8D84E3-00BA-4A46-8256-7E527D8B4480}" type="datetimeFigureOut">
               <a:rPr lang="en-US" smtClean="0"/>
-              <a:t>5/13/22</a:t>
+              <a:t>9/13/2023</a:t>
             </a:fld>
             <a:endParaRPr lang="en-US"/>
           </a:p>
@@ -538,7 +538,7 @@
     </p:spTree>
     <p:extLst>
       <p:ext uri="{BB962C8B-B14F-4D97-AF65-F5344CB8AC3E}">
-        <p14:creationId xmlns:p14="http://schemas.microsoft.com/office/powerpoint/2010/main" val="27507652"/>
+        <p14:creationId xmlns:p14="http://schemas.microsoft.com/office/powerpoint/2010/main" val="4219692103"/>
       </p:ext>
     </p:extLst>
   </p:cSld>
@@ -695,7 +695,7 @@
           <a:p>
             <a:fld id="{9FE185F7-9B28-9F45-9F43-9CB5A0B99390}" type="datetimeFigureOut">
               <a:rPr lang="en-US" smtClean="0"/>
-              <a:t>5/13/22</a:t>
+              <a:t>9/13/2023</a:t>
             </a:fld>
             <a:endParaRPr lang="en-US"/>
           </a:p>
@@ -893,7 +893,7 @@
           <a:p>
             <a:fld id="{9FE185F7-9B28-9F45-9F43-9CB5A0B99390}" type="datetimeFigureOut">
               <a:rPr lang="en-US" smtClean="0"/>
-              <a:t>5/13/22</a:t>
+              <a:t>9/13/2023</a:t>
             </a:fld>
             <a:endParaRPr lang="en-US"/>
           </a:p>
@@ -1101,7 +1101,7 @@
           <a:p>
             <a:fld id="{9FE185F7-9B28-9F45-9F43-9CB5A0B99390}" type="datetimeFigureOut">
               <a:rPr lang="en-US" smtClean="0"/>
-              <a:t>5/13/22</a:t>
+              <a:t>9/13/2023</a:t>
             </a:fld>
             <a:endParaRPr lang="en-US"/>
           </a:p>
@@ -1299,7 +1299,7 @@
           <a:p>
             <a:fld id="{9FE185F7-9B28-9F45-9F43-9CB5A0B99390}" type="datetimeFigureOut">
               <a:rPr lang="en-US" smtClean="0"/>
-              <a:t>5/13/22</a:t>
+              <a:t>9/13/2023</a:t>
             </a:fld>
             <a:endParaRPr lang="en-US"/>
           </a:p>
@@ -1574,7 +1574,7 @@
           <a:p>
             <a:fld id="{9FE185F7-9B28-9F45-9F43-9CB5A0B99390}" type="datetimeFigureOut">
               <a:rPr lang="en-US" smtClean="0"/>
-              <a:t>5/13/22</a:t>
+              <a:t>9/13/2023</a:t>
             </a:fld>
             <a:endParaRPr lang="en-US"/>
           </a:p>
@@ -1839,7 +1839,7 @@
           <a:p>
             <a:fld id="{9FE185F7-9B28-9F45-9F43-9CB5A0B99390}" type="datetimeFigureOut">
               <a:rPr lang="en-US" smtClean="0"/>
-              <a:t>5/13/22</a:t>
+              <a:t>9/13/2023</a:t>
             </a:fld>
             <a:endParaRPr lang="en-US"/>
           </a:p>
@@ -2251,7 +2251,7 @@
           <a:p>
             <a:fld id="{9FE185F7-9B28-9F45-9F43-9CB5A0B99390}" type="datetimeFigureOut">
               <a:rPr lang="en-US" smtClean="0"/>
-              <a:t>5/13/22</a:t>
+              <a:t>9/13/2023</a:t>
             </a:fld>
             <a:endParaRPr lang="en-US"/>
           </a:p>
@@ -2392,7 +2392,7 @@
           <a:p>
             <a:fld id="{9FE185F7-9B28-9F45-9F43-9CB5A0B99390}" type="datetimeFigureOut">
               <a:rPr lang="en-US" smtClean="0"/>
-              <a:t>5/13/22</a:t>
+              <a:t>9/13/2023</a:t>
             </a:fld>
             <a:endParaRPr lang="en-US"/>
           </a:p>
@@ -2505,7 +2505,7 @@
           <a:p>
             <a:fld id="{9FE185F7-9B28-9F45-9F43-9CB5A0B99390}" type="datetimeFigureOut">
               <a:rPr lang="en-US" smtClean="0"/>
-              <a:t>5/13/22</a:t>
+              <a:t>9/13/2023</a:t>
             </a:fld>
             <a:endParaRPr lang="en-US"/>
           </a:p>
@@ -2816,7 +2816,7 @@
           <a:p>
             <a:fld id="{9FE185F7-9B28-9F45-9F43-9CB5A0B99390}" type="datetimeFigureOut">
               <a:rPr lang="en-US" smtClean="0"/>
-              <a:t>5/13/22</a:t>
+              <a:t>9/13/2023</a:t>
             </a:fld>
             <a:endParaRPr lang="en-US"/>
           </a:p>
@@ -3104,7 +3104,7 @@
           <a:p>
             <a:fld id="{9FE185F7-9B28-9F45-9F43-9CB5A0B99390}" type="datetimeFigureOut">
               <a:rPr lang="en-US" smtClean="0"/>
-              <a:t>5/13/22</a:t>
+              <a:t>9/13/2023</a:t>
             </a:fld>
             <a:endParaRPr lang="en-US"/>
           </a:p>
@@ -3345,7 +3345,7 @@
           <a:p>
             <a:fld id="{9FE185F7-9B28-9F45-9F43-9CB5A0B99390}" type="datetimeFigureOut">
               <a:rPr lang="en-US" smtClean="0"/>
-              <a:t>5/13/22</a:t>
+              <a:t>9/13/2023</a:t>
             </a:fld>
             <a:endParaRPr lang="en-US"/>
           </a:p>
@@ -3775,10 +3775,10 @@
       </p:grpSpPr>
       <p:sp>
         <p:nvSpPr>
-          <p:cNvPr id="125" name="Rectangle 124">
-            <a:extLst>
-              <a:ext uri="{FF2B5EF4-FFF2-40B4-BE49-F238E27FC236}">
-                <a16:creationId xmlns:a16="http://schemas.microsoft.com/office/drawing/2014/main" id="{09FB3F18-5D37-9F42-BE21-657A66F925D2}"/>
+          <p:cNvPr id="75" name="Rectangle 74">
+            <a:extLst>
+              <a:ext uri="{FF2B5EF4-FFF2-40B4-BE49-F238E27FC236}">
+                <a16:creationId xmlns:a16="http://schemas.microsoft.com/office/drawing/2014/main" id="{E88495CB-549A-4241-97CF-390FF03DEE49}"/>
               </a:ext>
             </a:extLst>
           </p:cNvPr>
@@ -3787,8 +3787,8 @@
         </p:nvSpPr>
         <p:spPr>
           <a:xfrm>
-            <a:off x="956287" y="199793"/>
-            <a:ext cx="10013018" cy="5633740"/>
+            <a:off x="481659" y="199795"/>
+            <a:ext cx="10487647" cy="5633738"/>
           </a:xfrm>
           <a:prstGeom prst="rect">
             <a:avLst/>
@@ -3819,108 +3819,20 @@
           </a:fontRef>
         </p:style>
         <p:txBody>
-          <a:bodyPr rot="0" spcFirstLastPara="0" vert="horz" wrap="square" lIns="457200" tIns="91440" rIns="91440" bIns="45720" numCol="1" spcCol="0" rtlCol="0" fromWordArt="0" anchor="t" anchorCtr="0" forceAA="0" compatLnSpc="1">
-            <a:prstTxWarp prst="textNoShape">
-              <a:avLst/>
-            </a:prstTxWarp>
-            <a:noAutofit/>
-          </a:bodyPr>
-          <a:lstStyle>
-            <a:lvl1pPr>
-              <a:defRPr>
-                <a:solidFill>
-                  <a:schemeClr val="lt1"/>
-                </a:solidFill>
-                <a:latin typeface="+mn-lt"/>
-                <a:ea typeface="+mn-ea"/>
-                <a:cs typeface="+mn-cs"/>
-              </a:defRPr>
-            </a:lvl1pPr>
-            <a:lvl2pPr>
-              <a:defRPr>
-                <a:solidFill>
-                  <a:schemeClr val="lt1"/>
-                </a:solidFill>
-                <a:latin typeface="+mn-lt"/>
-                <a:ea typeface="+mn-ea"/>
-                <a:cs typeface="+mn-cs"/>
-              </a:defRPr>
-            </a:lvl2pPr>
-            <a:lvl3pPr>
-              <a:defRPr>
-                <a:solidFill>
-                  <a:schemeClr val="lt1"/>
-                </a:solidFill>
-                <a:latin typeface="+mn-lt"/>
-                <a:ea typeface="+mn-ea"/>
-                <a:cs typeface="+mn-cs"/>
-              </a:defRPr>
-            </a:lvl3pPr>
-            <a:lvl4pPr>
-              <a:defRPr>
-                <a:solidFill>
-                  <a:schemeClr val="lt1"/>
-                </a:solidFill>
-                <a:latin typeface="+mn-lt"/>
-                <a:ea typeface="+mn-ea"/>
-                <a:cs typeface="+mn-cs"/>
-              </a:defRPr>
-            </a:lvl4pPr>
-            <a:lvl5pPr>
-              <a:defRPr>
-                <a:solidFill>
-                  <a:schemeClr val="lt1"/>
-                </a:solidFill>
-                <a:latin typeface="+mn-lt"/>
-                <a:ea typeface="+mn-ea"/>
-                <a:cs typeface="+mn-cs"/>
-              </a:defRPr>
-            </a:lvl5pPr>
-            <a:lvl6pPr>
-              <a:defRPr>
-                <a:solidFill>
-                  <a:schemeClr val="lt1"/>
-                </a:solidFill>
-                <a:latin typeface="+mn-lt"/>
-                <a:ea typeface="+mn-ea"/>
-                <a:cs typeface="+mn-cs"/>
-              </a:defRPr>
-            </a:lvl6pPr>
-            <a:lvl7pPr>
-              <a:defRPr>
-                <a:solidFill>
-                  <a:schemeClr val="lt1"/>
-                </a:solidFill>
-                <a:latin typeface="+mn-lt"/>
-                <a:ea typeface="+mn-ea"/>
-                <a:cs typeface="+mn-cs"/>
-              </a:defRPr>
-            </a:lvl7pPr>
-            <a:lvl8pPr>
-              <a:defRPr>
-                <a:solidFill>
-                  <a:schemeClr val="lt1"/>
-                </a:solidFill>
-                <a:latin typeface="+mn-lt"/>
-                <a:ea typeface="+mn-ea"/>
-                <a:cs typeface="+mn-cs"/>
-              </a:defRPr>
-            </a:lvl8pPr>
-            <a:lvl9pPr>
-              <a:defRPr>
-                <a:solidFill>
-                  <a:schemeClr val="lt1"/>
-                </a:solidFill>
-                <a:latin typeface="+mn-lt"/>
-                <a:ea typeface="+mn-ea"/>
-                <a:cs typeface="+mn-cs"/>
-              </a:defRPr>
-            </a:lvl9pPr>
-          </a:lstStyle>
-          <a:p>
-            <a:pPr algn="l"/>
-            <a:r>
-              <a:rPr lang="en-US" sz="1400" dirty="0">
+          <a:bodyPr lIns="502920" tIns="91440"/>
+          <a:lstStyle/>
+          <a:p>
+            <a:pPr eaLnBrk="1" fontAlgn="auto" hangingPunct="1">
+              <a:spcBef>
+                <a:spcPts val="0"/>
+              </a:spcBef>
+              <a:spcAft>
+                <a:spcPts val="0"/>
+              </a:spcAft>
+              <a:defRPr/>
+            </a:pPr>
+            <a:r>
+              <a:rPr lang="en-US" sz="1200" dirty="0">
                 <a:solidFill>
                   <a:sysClr val="windowText" lastClr="000000"/>
                 </a:solidFill>
@@ -3932,189 +3844,6 @@
           </a:p>
         </p:txBody>
       </p:sp>
-      <p:pic>
-        <p:nvPicPr>
-          <p:cNvPr id="126" name="Graphic 2">
-            <a:extLst>
-              <a:ext uri="{FF2B5EF4-FFF2-40B4-BE49-F238E27FC236}">
-                <a16:creationId xmlns:a16="http://schemas.microsoft.com/office/drawing/2014/main" id="{F04267D0-7955-2C4A-842B-D8A3A9599CC0}"/>
-              </a:ext>
-            </a:extLst>
-          </p:cNvPr>
-          <p:cNvPicPr>
-            <a:picLocks noChangeAspect="1"/>
-          </p:cNvPicPr>
-          <p:nvPr/>
-        </p:nvPicPr>
-        <p:blipFill>
-          <a:blip r:embed="rId3">
-            <a:extLst>
-              <a:ext uri="{96DAC541-7B7A-43D3-8B79-37D633B846F1}">
-                <asvg:svgBlip xmlns:asvg="http://schemas.microsoft.com/office/drawing/2016/SVG/main" r:embed="rId4"/>
-              </a:ext>
-            </a:extLst>
-          </a:blip>
-          <a:stretch>
-            <a:fillRect/>
-          </a:stretch>
-        </p:blipFill>
-        <p:spPr>
-          <a:xfrm>
-            <a:off x="959490" y="199793"/>
-            <a:ext cx="330200" cy="330200"/>
-          </a:xfrm>
-          <a:prstGeom prst="rect">
-            <a:avLst/>
-          </a:prstGeom>
-        </p:spPr>
-      </p:pic>
-      <p:sp>
-        <p:nvSpPr>
-          <p:cNvPr id="129" name="Rectangle 128">
-            <a:extLst>
-              <a:ext uri="{FF2B5EF4-FFF2-40B4-BE49-F238E27FC236}">
-                <a16:creationId xmlns:a16="http://schemas.microsoft.com/office/drawing/2014/main" id="{FB73AA4D-BE37-B546-8168-72555838077A}"/>
-              </a:ext>
-            </a:extLst>
-          </p:cNvPr>
-          <p:cNvSpPr/>
-          <p:nvPr/>
-        </p:nvSpPr>
-        <p:spPr>
-          <a:xfrm>
-            <a:off x="1094079" y="689208"/>
-            <a:ext cx="6155248" cy="4966525"/>
-          </a:xfrm>
-          <a:prstGeom prst="rect">
-            <a:avLst/>
-          </a:prstGeom>
-          <a:noFill/>
-          <a:ln w="12700">
-            <a:solidFill>
-              <a:schemeClr val="tx1"/>
-            </a:solidFill>
-            <a:prstDash val="solid"/>
-          </a:ln>
-        </p:spPr>
-        <p:style>
-          <a:lnRef idx="2">
-            <a:schemeClr val="accent1">
-              <a:shade val="50000"/>
-            </a:schemeClr>
-          </a:lnRef>
-          <a:fillRef idx="1">
-            <a:schemeClr val="accent1"/>
-          </a:fillRef>
-          <a:effectRef idx="0">
-            <a:schemeClr val="accent1"/>
-          </a:effectRef>
-          <a:fontRef idx="minor">
-            <a:schemeClr val="lt1"/>
-          </a:fontRef>
-        </p:style>
-        <p:txBody>
-          <a:bodyPr rot="0" spcFirstLastPara="0" vertOverflow="overflow" horzOverflow="overflow" vert="horz" wrap="square" lIns="91440" tIns="91440" rIns="91440" bIns="45720" numCol="1" spcCol="0" rtlCol="0" fromWordArt="0" anchor="t" anchorCtr="0" forceAA="0" compatLnSpc="1">
-            <a:prstTxWarp prst="textNoShape">
-              <a:avLst/>
-            </a:prstTxWarp>
-            <a:noAutofit/>
-          </a:bodyPr>
-          <a:lstStyle/>
-          <a:p>
-            <a:pPr algn="ctr"/>
-            <a:r>
-              <a:rPr lang="en-US" sz="1400" dirty="0">
-                <a:solidFill>
-                  <a:schemeClr val="tx1"/>
-                </a:solidFill>
-                <a:latin typeface="Arial" panose="020B0604020202020204" pitchFamily="34" charset="0"/>
-                <a:cs typeface="Arial" panose="020B0604020202020204" pitchFamily="34" charset="0"/>
-              </a:rPr>
-              <a:t>Organization Management Account</a:t>
-            </a:r>
-          </a:p>
-        </p:txBody>
-      </p:sp>
-      <p:sp>
-        <p:nvSpPr>
-          <p:cNvPr id="128" name="Rectangle 127">
-            <a:extLst>
-              <a:ext uri="{FF2B5EF4-FFF2-40B4-BE49-F238E27FC236}">
-                <a16:creationId xmlns:a16="http://schemas.microsoft.com/office/drawing/2014/main" id="{747041A4-100F-0D48-87F9-E63DDDFD96C6}"/>
-              </a:ext>
-            </a:extLst>
-          </p:cNvPr>
-          <p:cNvSpPr/>
-          <p:nvPr/>
-        </p:nvSpPr>
-        <p:spPr>
-          <a:xfrm>
-            <a:off x="7356766" y="689208"/>
-            <a:ext cx="3447282" cy="2763300"/>
-          </a:xfrm>
-          <a:prstGeom prst="rect">
-            <a:avLst/>
-          </a:prstGeom>
-          <a:noFill/>
-          <a:ln w="12700">
-            <a:solidFill>
-              <a:schemeClr val="tx1"/>
-            </a:solidFill>
-            <a:prstDash val="solid"/>
-          </a:ln>
-        </p:spPr>
-        <p:style>
-          <a:lnRef idx="2">
-            <a:schemeClr val="accent1">
-              <a:shade val="50000"/>
-            </a:schemeClr>
-          </a:lnRef>
-          <a:fillRef idx="1">
-            <a:schemeClr val="accent1"/>
-          </a:fillRef>
-          <a:effectRef idx="0">
-            <a:schemeClr val="accent1"/>
-          </a:effectRef>
-          <a:fontRef idx="minor">
-            <a:schemeClr val="lt1"/>
-          </a:fontRef>
-        </p:style>
-        <p:txBody>
-          <a:bodyPr rot="0" spcFirstLastPara="0" vertOverflow="overflow" horzOverflow="overflow" vert="horz" wrap="square" lIns="91440" tIns="91440" rIns="91440" bIns="45720" numCol="1" spcCol="0" rtlCol="0" fromWordArt="0" anchor="t" anchorCtr="0" forceAA="0" compatLnSpc="1">
-            <a:prstTxWarp prst="textNoShape">
-              <a:avLst/>
-            </a:prstTxWarp>
-            <a:noAutofit/>
-          </a:bodyPr>
-          <a:lstStyle/>
-          <a:p>
-            <a:pPr algn="ctr"/>
-            <a:r>
-              <a:rPr lang="en-US" sz="1400" dirty="0">
-                <a:solidFill>
-                  <a:schemeClr val="tx1"/>
-                </a:solidFill>
-                <a:latin typeface="Arial" panose="020B0604020202020204" pitchFamily="34" charset="0"/>
-                <a:cs typeface="Arial" panose="020B0604020202020204" pitchFamily="34" charset="0"/>
-              </a:rPr>
-              <a:t>All Existing and Future </a:t>
-            </a:r>
-          </a:p>
-          <a:p>
-            <a:pPr algn="ctr"/>
-            <a:r>
-              <a:rPr lang="en-US" sz="1400" dirty="0">
-                <a:solidFill>
-                  <a:schemeClr val="tx1"/>
-                </a:solidFill>
-                <a:latin typeface="Arial" panose="020B0604020202020204" pitchFamily="34" charset="0"/>
-                <a:cs typeface="Arial" panose="020B0604020202020204" pitchFamily="34" charset="0"/>
-              </a:rPr>
-              <a:t>Organization Member Accounts</a:t>
-            </a:r>
-          </a:p>
-        </p:txBody>
-      </p:sp>
       <p:sp>
         <p:nvSpPr>
           <p:cNvPr id="151" name="TextBox 150">
@@ -4129,7 +3858,7 @@
         </p:nvSpPr>
         <p:spPr>
           <a:xfrm>
-            <a:off x="1124590" y="1747053"/>
+            <a:off x="1316824" y="1947705"/>
             <a:ext cx="1307240" cy="430887"/>
           </a:xfrm>
           <a:prstGeom prst="rect">
@@ -4156,251 +3885,6 @@
       </p:sp>
       <p:sp>
         <p:nvSpPr>
-          <p:cNvPr id="153" name="Rectangle 152">
-            <a:extLst>
-              <a:ext uri="{FF2B5EF4-FFF2-40B4-BE49-F238E27FC236}">
-                <a16:creationId xmlns:a16="http://schemas.microsoft.com/office/drawing/2014/main" id="{CB91CC3D-9B41-4F4E-A36E-8EBAE5690590}"/>
-              </a:ext>
-            </a:extLst>
-          </p:cNvPr>
-          <p:cNvSpPr/>
-          <p:nvPr/>
-        </p:nvSpPr>
-        <p:spPr>
-          <a:xfrm>
-            <a:off x="1222695" y="1091610"/>
-            <a:ext cx="5898469" cy="3239386"/>
-          </a:xfrm>
-          <a:prstGeom prst="rect">
-            <a:avLst/>
-          </a:prstGeom>
-          <a:noFill/>
-          <a:ln w="12700">
-            <a:solidFill>
-              <a:schemeClr val="tx1"/>
-            </a:solidFill>
-            <a:prstDash val="dash"/>
-          </a:ln>
-        </p:spPr>
-        <p:style>
-          <a:lnRef idx="2">
-            <a:schemeClr val="accent1">
-              <a:shade val="50000"/>
-            </a:schemeClr>
-          </a:lnRef>
-          <a:fillRef idx="1">
-            <a:schemeClr val="accent1"/>
-          </a:fillRef>
-          <a:effectRef idx="0">
-            <a:schemeClr val="accent1"/>
-          </a:effectRef>
-          <a:fontRef idx="minor">
-            <a:schemeClr val="lt1"/>
-          </a:fontRef>
-        </p:style>
-        <p:txBody>
-          <a:bodyPr rot="0" spcFirstLastPara="0" vertOverflow="overflow" horzOverflow="overflow" vert="horz" wrap="square" lIns="91440" tIns="0" rIns="91440" bIns="45720" numCol="1" spcCol="0" rtlCol="0" fromWordArt="0" anchor="t" anchorCtr="0" forceAA="0" compatLnSpc="1">
-            <a:prstTxWarp prst="textNoShape">
-              <a:avLst/>
-            </a:prstTxWarp>
-            <a:noAutofit/>
-          </a:bodyPr>
-          <a:lstStyle/>
-          <a:p>
-            <a:r>
-              <a:rPr lang="en-US" sz="1100" b="1" dirty="0">
-                <a:solidFill>
-                  <a:schemeClr val="tx1"/>
-                </a:solidFill>
-              </a:rPr>
-              <a:t>Home-region</a:t>
-            </a:r>
-          </a:p>
-        </p:txBody>
-      </p:sp>
-      <p:sp>
-        <p:nvSpPr>
-          <p:cNvPr id="226" name="Oval 225">
-            <a:extLst>
-              <a:ext uri="{FF2B5EF4-FFF2-40B4-BE49-F238E27FC236}">
-                <a16:creationId xmlns:a16="http://schemas.microsoft.com/office/drawing/2014/main" id="{B075B0CF-8F6A-3947-BD02-50EB6DA85CEE}"/>
-              </a:ext>
-            </a:extLst>
-          </p:cNvPr>
-          <p:cNvSpPr/>
-          <p:nvPr/>
-        </p:nvSpPr>
-        <p:spPr>
-          <a:xfrm>
-            <a:off x="1116041" y="716639"/>
-            <a:ext cx="253435" cy="212902"/>
-          </a:xfrm>
-          <a:prstGeom prst="ellipse">
-            <a:avLst/>
-          </a:prstGeom>
-          <a:solidFill>
-            <a:schemeClr val="tx1"/>
-          </a:solidFill>
-          <a:ln>
-            <a:solidFill>
-              <a:schemeClr val="tx1"/>
-            </a:solidFill>
-          </a:ln>
-        </p:spPr>
-        <p:style>
-          <a:lnRef idx="2">
-            <a:schemeClr val="accent1">
-              <a:shade val="50000"/>
-            </a:schemeClr>
-          </a:lnRef>
-          <a:fillRef idx="1">
-            <a:schemeClr val="accent1"/>
-          </a:fillRef>
-          <a:effectRef idx="0">
-            <a:schemeClr val="accent1"/>
-          </a:effectRef>
-          <a:fontRef idx="minor">
-            <a:schemeClr val="lt1"/>
-          </a:fontRef>
-        </p:style>
-        <p:txBody>
-          <a:bodyPr lIns="0" tIns="0" rIns="0" bIns="0" rtlCol="0" anchor="ctr"/>
-          <a:lstStyle/>
-          <a:p>
-            <a:pPr algn="ctr"/>
-            <a:r>
-              <a:rPr lang="en-US" sz="800" dirty="0">
-                <a:latin typeface="Arial" panose="020B0604020202020204" pitchFamily="34" charset="0"/>
-                <a:cs typeface="Arial" panose="020B0604020202020204" pitchFamily="34" charset="0"/>
-              </a:rPr>
-              <a:t>1.0</a:t>
-            </a:r>
-          </a:p>
-        </p:txBody>
-      </p:sp>
-      <p:sp>
-        <p:nvSpPr>
-          <p:cNvPr id="233" name="Oval 232">
-            <a:extLst>
-              <a:ext uri="{FF2B5EF4-FFF2-40B4-BE49-F238E27FC236}">
-                <a16:creationId xmlns:a16="http://schemas.microsoft.com/office/drawing/2014/main" id="{4E5E3A8F-6978-7E4A-B538-0774C0EF83DA}"/>
-              </a:ext>
-            </a:extLst>
-          </p:cNvPr>
-          <p:cNvSpPr/>
-          <p:nvPr/>
-        </p:nvSpPr>
-        <p:spPr>
-          <a:xfrm>
-            <a:off x="7392580" y="714032"/>
-            <a:ext cx="253435" cy="212902"/>
-          </a:xfrm>
-          <a:prstGeom prst="ellipse">
-            <a:avLst/>
-          </a:prstGeom>
-          <a:solidFill>
-            <a:schemeClr val="tx1"/>
-          </a:solidFill>
-          <a:ln>
-            <a:solidFill>
-              <a:schemeClr val="tx1"/>
-            </a:solidFill>
-          </a:ln>
-        </p:spPr>
-        <p:style>
-          <a:lnRef idx="2">
-            <a:schemeClr val="accent1">
-              <a:shade val="50000"/>
-            </a:schemeClr>
-          </a:lnRef>
-          <a:fillRef idx="1">
-            <a:schemeClr val="accent1"/>
-          </a:fillRef>
-          <a:effectRef idx="0">
-            <a:schemeClr val="accent1"/>
-          </a:effectRef>
-          <a:fontRef idx="minor">
-            <a:schemeClr val="lt1"/>
-          </a:fontRef>
-        </p:style>
-        <p:txBody>
-          <a:bodyPr lIns="0" tIns="0" rIns="0" bIns="0" rtlCol="0" anchor="ctr"/>
-          <a:lstStyle/>
-          <a:p>
-            <a:pPr algn="ctr"/>
-            <a:r>
-              <a:rPr lang="en-US" sz="800" dirty="0"/>
-              <a:t>2.0</a:t>
-            </a:r>
-          </a:p>
-        </p:txBody>
-      </p:sp>
-      <p:sp>
-        <p:nvSpPr>
-          <p:cNvPr id="107" name="Rectangle 106">
-            <a:extLst>
-              <a:ext uri="{FF2B5EF4-FFF2-40B4-BE49-F238E27FC236}">
-                <a16:creationId xmlns:a16="http://schemas.microsoft.com/office/drawing/2014/main" id="{F987F7DF-6CB9-144D-9E1D-1E6008DD66FB}"/>
-              </a:ext>
-            </a:extLst>
-          </p:cNvPr>
-          <p:cNvSpPr/>
-          <p:nvPr/>
-        </p:nvSpPr>
-        <p:spPr>
-          <a:xfrm>
-            <a:off x="7483193" y="1275705"/>
-            <a:ext cx="3201858" cy="2078967"/>
-          </a:xfrm>
-          <a:prstGeom prst="rect">
-            <a:avLst/>
-          </a:prstGeom>
-          <a:noFill/>
-          <a:ln w="12700">
-            <a:solidFill>
-              <a:schemeClr val="tx1"/>
-            </a:solidFill>
-            <a:prstDash val="dash"/>
-          </a:ln>
-        </p:spPr>
-        <p:style>
-          <a:lnRef idx="2">
-            <a:schemeClr val="accent1">
-              <a:shade val="50000"/>
-            </a:schemeClr>
-          </a:lnRef>
-          <a:fillRef idx="1">
-            <a:schemeClr val="accent1"/>
-          </a:fillRef>
-          <a:effectRef idx="0">
-            <a:schemeClr val="accent1"/>
-          </a:effectRef>
-          <a:fontRef idx="minor">
-            <a:schemeClr val="lt1"/>
-          </a:fontRef>
-        </p:style>
-        <p:txBody>
-          <a:bodyPr rot="0" spcFirstLastPara="0" vertOverflow="overflow" horzOverflow="overflow" vert="horz" wrap="square" lIns="91440" tIns="0" rIns="91440" bIns="45720" numCol="1" spcCol="0" rtlCol="0" fromWordArt="0" anchor="t" anchorCtr="0" forceAA="0" compatLnSpc="1">
-            <a:prstTxWarp prst="textNoShape">
-              <a:avLst/>
-            </a:prstTxWarp>
-            <a:noAutofit/>
-          </a:bodyPr>
-          <a:lstStyle/>
-          <a:p>
-            <a:r>
-              <a:rPr lang="en-US" sz="1100" b="1" dirty="0">
-                <a:solidFill>
-                  <a:schemeClr val="tx1"/>
-                </a:solidFill>
-              </a:rPr>
-              <a:t>Home-region</a:t>
-            </a:r>
-          </a:p>
-        </p:txBody>
-      </p:sp>
-      <p:sp>
-        <p:nvSpPr>
           <p:cNvPr id="108" name="TextBox 107">
             <a:extLst>
               <a:ext uri="{FF2B5EF4-FFF2-40B4-BE49-F238E27FC236}">
@@ -4413,7 +3897,7 @@
         </p:nvSpPr>
         <p:spPr>
           <a:xfrm>
-            <a:off x="7448744" y="2300825"/>
+            <a:off x="7711732" y="2474672"/>
             <a:ext cx="1288498" cy="430887"/>
           </a:xfrm>
           <a:prstGeom prst="rect">
@@ -4453,7 +3937,7 @@
           <p:nvPr/>
         </p:nvPicPr>
         <p:blipFill>
-          <a:blip r:embed="rId5">
+          <a:blip r:embed="rId3">
             <a:extLst>
               <a:ext uri="{28A0092B-C50C-407E-A947-70E740481C1C}">
                 <a14:useLocalDpi xmlns:a14="http://schemas.microsoft.com/office/drawing/2010/main" val="0"/>
@@ -4674,7 +4158,7 @@
           <p:nvPr/>
         </p:nvPicPr>
         <p:blipFill>
-          <a:blip r:embed="rId6">
+          <a:blip r:embed="rId4">
             <a:extLst>
               <a:ext uri="{28A0092B-C50C-407E-A947-70E740481C1C}">
                 <a14:useLocalDpi xmlns:a14="http://schemas.microsoft.com/office/drawing/2010/main" val="0"/>
@@ -4895,7 +4379,7 @@
           <p:nvPr/>
         </p:nvPicPr>
         <p:blipFill>
-          <a:blip r:embed="rId6">
+          <a:blip r:embed="rId4">
             <a:extLst>
               <a:ext uri="{28A0092B-C50C-407E-A947-70E740481C1C}">
                 <a14:useLocalDpi xmlns:a14="http://schemas.microsoft.com/office/drawing/2010/main" val="0"/>
@@ -4909,7 +4393,7 @@
         </p:blipFill>
         <p:spPr bwMode="auto">
           <a:xfrm>
-            <a:off x="9460668" y="2363627"/>
+            <a:off x="9723656" y="2537474"/>
             <a:ext cx="457200" cy="457200"/>
           </a:xfrm>
           <a:prstGeom prst="rect">
@@ -4956,7 +4440,7 @@
         </p:nvSpPr>
         <p:spPr bwMode="auto">
           <a:xfrm>
-            <a:off x="9233956" y="2831856"/>
+            <a:off x="9496944" y="3005703"/>
             <a:ext cx="960294" cy="430887"/>
           </a:xfrm>
           <a:prstGeom prst="rect">
@@ -5117,7 +4601,7 @@
         </p:nvSpPr>
         <p:spPr bwMode="auto">
           <a:xfrm>
-            <a:off x="8871600" y="1849889"/>
+            <a:off x="8997132" y="4920934"/>
             <a:ext cx="1521364" cy="430887"/>
           </a:xfrm>
           <a:prstGeom prst="rect">
@@ -5277,7 +4761,7 @@
           <p:nvPr/>
         </p:nvPicPr>
         <p:blipFill>
-          <a:blip r:embed="rId7">
+          <a:blip r:embed="rId5">
             <a:extLst>
               <a:ext uri="{28A0092B-C50C-407E-A947-70E740481C1C}">
                 <a14:useLocalDpi xmlns:a14="http://schemas.microsoft.com/office/drawing/2010/main" val="0"/>
@@ -5291,7 +4775,7 @@
         </p:blipFill>
         <p:spPr bwMode="auto">
           <a:xfrm>
-            <a:off x="9403682" y="1481116"/>
+            <a:off x="9529214" y="4552161"/>
             <a:ext cx="457200" cy="457200"/>
           </a:xfrm>
           <a:prstGeom prst="rect">
@@ -5498,7 +4982,7 @@
           <p:nvPr/>
         </p:nvPicPr>
         <p:blipFill>
-          <a:blip r:embed="rId8">
+          <a:blip r:embed="rId6">
             <a:extLst>
               <a:ext uri="{28A0092B-C50C-407E-A947-70E740481C1C}">
                 <a14:useLocalDpi xmlns:a14="http://schemas.microsoft.com/office/drawing/2010/main" val="0"/>
@@ -5558,7 +5042,7 @@
           <p:nvPr/>
         </p:nvPicPr>
         <p:blipFill>
-          <a:blip r:embed="rId9">
+          <a:blip r:embed="rId7">
             <a:extLst>
               <a:ext uri="{28A0092B-C50C-407E-A947-70E740481C1C}">
                 <a14:useLocalDpi xmlns:a14="http://schemas.microsoft.com/office/drawing/2010/main" val="0"/>
@@ -5780,7 +5264,7 @@
         </p:nvSpPr>
         <p:spPr bwMode="auto">
           <a:xfrm>
-            <a:off x="1185804" y="3978556"/>
+            <a:off x="3055996" y="5044070"/>
             <a:ext cx="1119613" cy="261610"/>
           </a:xfrm>
           <a:prstGeom prst="rect">
@@ -5940,7 +5424,7 @@
           <p:nvPr/>
         </p:nvPicPr>
         <p:blipFill>
-          <a:blip r:embed="rId7">
+          <a:blip r:embed="rId5">
             <a:extLst>
               <a:ext uri="{28A0092B-C50C-407E-A947-70E740481C1C}">
                 <a14:useLocalDpi xmlns:a14="http://schemas.microsoft.com/office/drawing/2010/main" val="0"/>
@@ -5954,7 +5438,7 @@
         </p:blipFill>
         <p:spPr bwMode="auto">
           <a:xfrm>
-            <a:off x="1517010" y="3592386"/>
+            <a:off x="3387202" y="4657900"/>
             <a:ext cx="457200" cy="457200"/>
           </a:xfrm>
           <a:prstGeom prst="rect">
@@ -6263,7 +5747,7 @@
         </p:nvSpPr>
         <p:spPr>
           <a:xfrm>
-            <a:off x="1383627" y="3575074"/>
+            <a:off x="3253819" y="4640588"/>
             <a:ext cx="253435" cy="212902"/>
           </a:xfrm>
           <a:prstGeom prst="ellipse">
@@ -6323,7 +5807,7 @@
         </p:nvSpPr>
         <p:spPr>
           <a:xfrm>
-            <a:off x="9505564" y="1347403"/>
+            <a:off x="9917868" y="4524899"/>
             <a:ext cx="253435" cy="212902"/>
           </a:xfrm>
           <a:prstGeom prst="ellipse">
@@ -6383,7 +5867,7 @@
         </p:nvSpPr>
         <p:spPr>
           <a:xfrm>
-            <a:off x="9467756" y="2369160"/>
+            <a:off x="9614091" y="2445169"/>
             <a:ext cx="253435" cy="212902"/>
           </a:xfrm>
           <a:prstGeom prst="ellipse">
@@ -6444,7 +5928,7 @@
           <p:nvPr/>
         </p:nvPicPr>
         <p:blipFill>
-          <a:blip r:embed="rId10">
+          <a:blip r:embed="rId8">
             <a:extLst>
               <a:ext uri="{28A0092B-C50C-407E-A947-70E740481C1C}">
                 <a14:useLocalDpi xmlns:a14="http://schemas.microsoft.com/office/drawing/2010/main" val="0"/>
@@ -6458,7 +5942,7 @@
         </p:blipFill>
         <p:spPr bwMode="auto">
           <a:xfrm>
-            <a:off x="7864393" y="1858327"/>
+            <a:off x="8127381" y="2032174"/>
             <a:ext cx="457200" cy="457200"/>
           </a:xfrm>
           <a:prstGeom prst="rect">
@@ -6504,7 +5988,7 @@
           <p:nvPr/>
         </p:nvPicPr>
         <p:blipFill>
-          <a:blip r:embed="rId10">
+          <a:blip r:embed="rId8">
             <a:extLst>
               <a:ext uri="{28A0092B-C50C-407E-A947-70E740481C1C}">
                 <a14:useLocalDpi xmlns:a14="http://schemas.microsoft.com/office/drawing/2010/main" val="0"/>
@@ -6518,7 +6002,7 @@
         </p:blipFill>
         <p:spPr bwMode="auto">
           <a:xfrm>
-            <a:off x="1554488" y="1323900"/>
+            <a:off x="1746722" y="1524552"/>
             <a:ext cx="457200" cy="457200"/>
           </a:xfrm>
           <a:prstGeom prst="rect">
@@ -6563,7 +6047,7 @@
         </p:nvSpPr>
         <p:spPr>
           <a:xfrm>
-            <a:off x="1565175" y="1342780"/>
+            <a:off x="1633230" y="1441831"/>
             <a:ext cx="253435" cy="212902"/>
           </a:xfrm>
           <a:prstGeom prst="ellipse">
@@ -6623,7 +6107,7 @@
         </p:nvSpPr>
         <p:spPr>
           <a:xfrm>
-            <a:off x="7884251" y="1866674"/>
+            <a:off x="8011771" y="1946446"/>
             <a:ext cx="253435" cy="212902"/>
           </a:xfrm>
           <a:prstGeom prst="ellipse">
@@ -6669,32 +6153,254 @@
           </a:p>
         </p:txBody>
       </p:sp>
-      <p:sp>
-        <p:nvSpPr>
-          <p:cNvPr id="47" name="Rectangle 46">
-            <a:extLst>
-              <a:ext uri="{FF2B5EF4-FFF2-40B4-BE49-F238E27FC236}">
-                <a16:creationId xmlns:a16="http://schemas.microsoft.com/office/drawing/2014/main" id="{269BBD16-55AC-CE44-B8C7-99178239D5D6}"/>
-              </a:ext>
-            </a:extLst>
-          </p:cNvPr>
-          <p:cNvSpPr/>
+      <p:pic>
+        <p:nvPicPr>
+          <p:cNvPr id="48" name="Graphic 24">
+            <a:extLst>
+              <a:ext uri="{FF2B5EF4-FFF2-40B4-BE49-F238E27FC236}">
+                <a16:creationId xmlns:a16="http://schemas.microsoft.com/office/drawing/2014/main" id="{EAAB9E66-AC31-8E4D-AB38-E7EAEAEC1A7F}"/>
+              </a:ext>
+            </a:extLst>
+          </p:cNvPr>
+          <p:cNvPicPr>
+            <a:picLocks noChangeAspect="1" noChangeArrowheads="1"/>
+          </p:cNvPicPr>
           <p:nvPr/>
-        </p:nvSpPr>
-        <p:spPr>
-          <a:xfrm>
-            <a:off x="1200294" y="4471790"/>
-            <a:ext cx="5920870" cy="1049233"/>
+        </p:nvPicPr>
+        <p:blipFill>
+          <a:blip r:embed="rId3">
+            <a:extLst>
+              <a:ext uri="{28A0092B-C50C-407E-A947-70E740481C1C}">
+                <a14:useLocalDpi xmlns:a14="http://schemas.microsoft.com/office/drawing/2010/main" val="0"/>
+              </a:ext>
+            </a:extLst>
+          </a:blip>
+          <a:srcRect/>
+          <a:stretch>
+            <a:fillRect/>
+          </a:stretch>
+        </p:blipFill>
+        <p:spPr bwMode="auto">
+          <a:xfrm>
+            <a:off x="5609761" y="4624163"/>
+            <a:ext cx="457200" cy="457200"/>
           </a:xfrm>
           <a:prstGeom prst="rect">
             <a:avLst/>
           </a:prstGeom>
           <a:noFill/>
-          <a:ln w="12700">
+          <a:ln>
+            <a:noFill/>
+          </a:ln>
+          <a:extLst>
+            <a:ext uri="{909E8E84-426E-40DD-AFC4-6F175D3DCCD1}">
+              <a14:hiddenFill xmlns:a14="http://schemas.microsoft.com/office/drawing/2010/main">
+                <a:solidFill>
+                  <a:srgbClr val="FFFFFF"/>
+                </a:solidFill>
+              </a14:hiddenFill>
+            </a:ext>
+            <a:ext uri="{91240B29-F687-4F45-9708-019B960494DF}">
+              <a14:hiddenLine xmlns:a14="http://schemas.microsoft.com/office/drawing/2010/main" w="9525">
+                <a:solidFill>
+                  <a:srgbClr val="000000"/>
+                </a:solidFill>
+                <a:miter lim="800000"/>
+                <a:headEnd/>
+                <a:tailEnd/>
+              </a14:hiddenLine>
+            </a:ext>
+          </a:extLst>
+        </p:spPr>
+      </p:pic>
+      <p:sp>
+        <p:nvSpPr>
+          <p:cNvPr id="51" name="TextBox 26">
+            <a:extLst>
+              <a:ext uri="{FF2B5EF4-FFF2-40B4-BE49-F238E27FC236}">
+                <a16:creationId xmlns:a16="http://schemas.microsoft.com/office/drawing/2014/main" id="{D4EF2674-09A5-D242-ADA6-DA1C330F8568}"/>
+              </a:ext>
+            </a:extLst>
+          </p:cNvPr>
+          <p:cNvSpPr txBox="1">
+            <a:spLocks noChangeArrowheads="1"/>
+          </p:cNvSpPr>
+          <p:nvPr/>
+        </p:nvSpPr>
+        <p:spPr bwMode="auto">
+          <a:xfrm>
+            <a:off x="5271866" y="5029111"/>
+            <a:ext cx="1143852" cy="430887"/>
+          </a:xfrm>
+          <a:prstGeom prst="rect">
+            <a:avLst/>
+          </a:prstGeom>
+          <a:noFill/>
+          <a:ln>
+            <a:noFill/>
+          </a:ln>
+          <a:extLst>
+            <a:ext uri="{909E8E84-426E-40DD-AFC4-6F175D3DCCD1}">
+              <a14:hiddenFill xmlns:a14="http://schemas.microsoft.com/office/drawing/2010/main">
+                <a:solidFill>
+                  <a:srgbClr val="FFFFFF"/>
+                </a:solidFill>
+              </a14:hiddenFill>
+            </a:ext>
+            <a:ext uri="{91240B29-F687-4F45-9708-019B960494DF}">
+              <a14:hiddenLine xmlns:a14="http://schemas.microsoft.com/office/drawing/2010/main" w="9525">
+                <a:solidFill>
+                  <a:srgbClr val="000000"/>
+                </a:solidFill>
+                <a:miter lim="800000"/>
+                <a:headEnd/>
+                <a:tailEnd/>
+              </a14:hiddenLine>
+            </a:ext>
+          </a:extLst>
+        </p:spPr>
+        <p:txBody>
+          <a:bodyPr wrap="square">
+            <a:spAutoFit/>
+          </a:bodyPr>
+          <a:lstStyle>
+            <a:lvl1pPr>
+              <a:defRPr>
+                <a:solidFill>
+                  <a:schemeClr val="tx1"/>
+                </a:solidFill>
+                <a:latin typeface="Calibri" panose="020F0502020204030204" pitchFamily="34" charset="0"/>
+              </a:defRPr>
+            </a:lvl1pPr>
+            <a:lvl2pPr marL="742950" indent="-285750">
+              <a:defRPr>
+                <a:solidFill>
+                  <a:schemeClr val="tx1"/>
+                </a:solidFill>
+                <a:latin typeface="Calibri" panose="020F0502020204030204" pitchFamily="34" charset="0"/>
+              </a:defRPr>
+            </a:lvl2pPr>
+            <a:lvl3pPr marL="1143000" indent="-228600">
+              <a:defRPr>
+                <a:solidFill>
+                  <a:schemeClr val="tx1"/>
+                </a:solidFill>
+                <a:latin typeface="Calibri" panose="020F0502020204030204" pitchFamily="34" charset="0"/>
+              </a:defRPr>
+            </a:lvl3pPr>
+            <a:lvl4pPr marL="1600200" indent="-228600">
+              <a:defRPr>
+                <a:solidFill>
+                  <a:schemeClr val="tx1"/>
+                </a:solidFill>
+                <a:latin typeface="Calibri" panose="020F0502020204030204" pitchFamily="34" charset="0"/>
+              </a:defRPr>
+            </a:lvl4pPr>
+            <a:lvl5pPr marL="2057400" indent="-228600">
+              <a:defRPr>
+                <a:solidFill>
+                  <a:schemeClr val="tx1"/>
+                </a:solidFill>
+                <a:latin typeface="Calibri" panose="020F0502020204030204" pitchFamily="34" charset="0"/>
+              </a:defRPr>
+            </a:lvl5pPr>
+            <a:lvl6pPr marL="2514600" indent="-228600" eaLnBrk="0" fontAlgn="base" hangingPunct="0">
+              <a:spcBef>
+                <a:spcPct val="0"/>
+              </a:spcBef>
+              <a:spcAft>
+                <a:spcPct val="0"/>
+              </a:spcAft>
+              <a:defRPr>
+                <a:solidFill>
+                  <a:schemeClr val="tx1"/>
+                </a:solidFill>
+                <a:latin typeface="Calibri" panose="020F0502020204030204" pitchFamily="34" charset="0"/>
+              </a:defRPr>
+            </a:lvl6pPr>
+            <a:lvl7pPr marL="2971800" indent="-228600" eaLnBrk="0" fontAlgn="base" hangingPunct="0">
+              <a:spcBef>
+                <a:spcPct val="0"/>
+              </a:spcBef>
+              <a:spcAft>
+                <a:spcPct val="0"/>
+              </a:spcAft>
+              <a:defRPr>
+                <a:solidFill>
+                  <a:schemeClr val="tx1"/>
+                </a:solidFill>
+                <a:latin typeface="Calibri" panose="020F0502020204030204" pitchFamily="34" charset="0"/>
+              </a:defRPr>
+            </a:lvl7pPr>
+            <a:lvl8pPr marL="3429000" indent="-228600" eaLnBrk="0" fontAlgn="base" hangingPunct="0">
+              <a:spcBef>
+                <a:spcPct val="0"/>
+              </a:spcBef>
+              <a:spcAft>
+                <a:spcPct val="0"/>
+              </a:spcAft>
+              <a:defRPr>
+                <a:solidFill>
+                  <a:schemeClr val="tx1"/>
+                </a:solidFill>
+                <a:latin typeface="Calibri" panose="020F0502020204030204" pitchFamily="34" charset="0"/>
+              </a:defRPr>
+            </a:lvl8pPr>
+            <a:lvl9pPr marL="3886200" indent="-228600" eaLnBrk="0" fontAlgn="base" hangingPunct="0">
+              <a:spcBef>
+                <a:spcPct val="0"/>
+              </a:spcBef>
+              <a:spcAft>
+                <a:spcPct val="0"/>
+              </a:spcAft>
+              <a:defRPr>
+                <a:solidFill>
+                  <a:schemeClr val="tx1"/>
+                </a:solidFill>
+                <a:latin typeface="Calibri" panose="020F0502020204030204" pitchFamily="34" charset="0"/>
+              </a:defRPr>
+            </a:lvl9pPr>
+          </a:lstStyle>
+          <a:p>
+            <a:pPr algn="ctr" eaLnBrk="1" hangingPunct="1"/>
+            <a:r>
+              <a:rPr lang="en-US" altLang="en-US" sz="1100" dirty="0">
+                <a:latin typeface="Arial" panose="020B0604020202020204" pitchFamily="34" charset="0"/>
+                <a:ea typeface="Amazon Ember" panose="020B0603020204020204" pitchFamily="34" charset="0"/>
+                <a:cs typeface="Arial" panose="020B0604020202020204" pitchFamily="34" charset="0"/>
+              </a:rPr>
+              <a:t>Global Event Rules</a:t>
+            </a:r>
+          </a:p>
+        </p:txBody>
+      </p:sp>
+      <p:sp>
+        <p:nvSpPr>
+          <p:cNvPr id="68" name="Oval 67">
+            <a:extLst>
+              <a:ext uri="{FF2B5EF4-FFF2-40B4-BE49-F238E27FC236}">
+                <a16:creationId xmlns:a16="http://schemas.microsoft.com/office/drawing/2014/main" id="{B2F2B0A9-E50F-F141-8975-4E45BF614C42}"/>
+              </a:ext>
+            </a:extLst>
+          </p:cNvPr>
+          <p:cNvSpPr/>
+          <p:nvPr/>
+        </p:nvSpPr>
+        <p:spPr>
+          <a:xfrm>
+            <a:off x="5434099" y="4512566"/>
+            <a:ext cx="253435" cy="212902"/>
+          </a:xfrm>
+          <a:prstGeom prst="ellipse">
+            <a:avLst/>
+          </a:prstGeom>
+          <a:solidFill>
+            <a:schemeClr val="tx1"/>
+          </a:solidFill>
+          <a:ln>
             <a:solidFill>
               <a:schemeClr val="tx1"/>
             </a:solidFill>
-            <a:prstDash val="dash"/>
           </a:ln>
         </p:spPr>
         <p:style>
@@ -6714,31 +6420,26 @@
           </a:fontRef>
         </p:style>
         <p:txBody>
-          <a:bodyPr rot="0" spcFirstLastPara="0" vertOverflow="overflow" horzOverflow="overflow" vert="horz" wrap="square" lIns="91440" tIns="0" rIns="91440" bIns="45720" numCol="1" spcCol="0" rtlCol="0" fromWordArt="0" anchor="t" anchorCtr="0" forceAA="0" compatLnSpc="1">
-            <a:prstTxWarp prst="textNoShape">
-              <a:avLst/>
-            </a:prstTxWarp>
-            <a:noAutofit/>
-          </a:bodyPr>
+          <a:bodyPr lIns="0" tIns="0" rIns="0" bIns="0" rtlCol="0" anchor="ctr"/>
           <a:lstStyle/>
           <a:p>
-            <a:r>
-              <a:rPr lang="en-US" sz="1200" b="1" dirty="0">
-                <a:solidFill>
-                  <a:schemeClr val="tx1"/>
-                </a:solidFill>
+            <a:pPr algn="ctr"/>
+            <a:r>
+              <a:rPr lang="en-US" sz="800" dirty="0">
+                <a:latin typeface="Arial" panose="020B0604020202020204" pitchFamily="34" charset="0"/>
+                <a:cs typeface="Arial" panose="020B0604020202020204" pitchFamily="34" charset="0"/>
               </a:rPr>
-              <a:t>Global-region</a:t>
+              <a:t>1.4</a:t>
             </a:r>
           </a:p>
         </p:txBody>
       </p:sp>
       <p:pic>
         <p:nvPicPr>
-          <p:cNvPr id="48" name="Graphic 24">
-            <a:extLst>
-              <a:ext uri="{FF2B5EF4-FFF2-40B4-BE49-F238E27FC236}">
-                <a16:creationId xmlns:a16="http://schemas.microsoft.com/office/drawing/2014/main" id="{EAAB9E66-AC31-8E4D-AB38-E7EAEAEC1A7F}"/>
+          <p:cNvPr id="69" name="Graphic 17">
+            <a:extLst>
+              <a:ext uri="{FF2B5EF4-FFF2-40B4-BE49-F238E27FC236}">
+                <a16:creationId xmlns:a16="http://schemas.microsoft.com/office/drawing/2014/main" id="{EF435EE0-6B48-DF4D-BA0F-ABF4A4C17738}"/>
               </a:ext>
             </a:extLst>
           </p:cNvPr>
@@ -6748,7 +6449,7 @@
           <p:nvPr/>
         </p:nvPicPr>
         <p:blipFill>
-          <a:blip r:embed="rId5">
+          <a:blip r:embed="rId9">
             <a:extLst>
               <a:ext uri="{28A0092B-C50C-407E-A947-70E740481C1C}">
                 <a14:useLocalDpi xmlns:a14="http://schemas.microsoft.com/office/drawing/2010/main" val="0"/>
@@ -6762,7 +6463,7 @@
         </p:blipFill>
         <p:spPr bwMode="auto">
           <a:xfrm>
-            <a:off x="2704725" y="4624163"/>
+            <a:off x="5476681" y="1190331"/>
             <a:ext cx="457200" cy="457200"/>
           </a:xfrm>
           <a:prstGeom prst="rect">
@@ -6795,22 +6496,150 @@
       </p:pic>
       <p:sp>
         <p:nvSpPr>
-          <p:cNvPr id="51" name="TextBox 26">
-            <a:extLst>
-              <a:ext uri="{FF2B5EF4-FFF2-40B4-BE49-F238E27FC236}">
-                <a16:creationId xmlns:a16="http://schemas.microsoft.com/office/drawing/2014/main" id="{D4EF2674-09A5-D242-ADA6-DA1C330F8568}"/>
-              </a:ext>
-            </a:extLst>
-          </p:cNvPr>
-          <p:cNvSpPr txBox="1">
-            <a:spLocks noChangeArrowheads="1"/>
-          </p:cNvSpPr>
+          <p:cNvPr id="70" name="TextBox 2">
+            <a:extLst>
+              <a:ext uri="{FF2B5EF4-FFF2-40B4-BE49-F238E27FC236}">
+                <a16:creationId xmlns:a16="http://schemas.microsoft.com/office/drawing/2014/main" id="{AAC8ED0A-7591-EA46-B9A9-432BF3E6CCFC}"/>
+              </a:ext>
+            </a:extLst>
+          </p:cNvPr>
+          <p:cNvSpPr txBox="1"/>
           <p:nvPr/>
         </p:nvSpPr>
+        <p:spPr>
+          <a:xfrm>
+            <a:off x="5242156" y="1592361"/>
+            <a:ext cx="932275" cy="261610"/>
+          </a:xfrm>
+          <a:prstGeom prst="rect">
+            <a:avLst/>
+          </a:prstGeom>
+          <a:noFill/>
+        </p:spPr>
+        <p:style>
+          <a:lnRef idx="0">
+            <a:scrgbClr r="0" g="0" b="0"/>
+          </a:lnRef>
+          <a:fillRef idx="0">
+            <a:scrgbClr r="0" g="0" b="0"/>
+          </a:fillRef>
+          <a:effectRef idx="0">
+            <a:scrgbClr r="0" g="0" b="0"/>
+          </a:effectRef>
+          <a:fontRef idx="major"/>
+        </p:style>
+        <p:txBody>
+          <a:bodyPr wrap="square" rtlCol="0">
+            <a:spAutoFit/>
+          </a:bodyPr>
+          <a:lstStyle>
+            <a:lvl1pPr>
+              <a:defRPr>
+                <a:latin typeface="+mj-lt"/>
+                <a:ea typeface="+mj-ea"/>
+                <a:cs typeface="+mj-cs"/>
+              </a:defRPr>
+            </a:lvl1pPr>
+            <a:lvl2pPr>
+              <a:defRPr>
+                <a:latin typeface="+mj-lt"/>
+                <a:ea typeface="+mj-ea"/>
+                <a:cs typeface="+mj-cs"/>
+              </a:defRPr>
+            </a:lvl2pPr>
+            <a:lvl3pPr>
+              <a:defRPr>
+                <a:latin typeface="+mj-lt"/>
+                <a:ea typeface="+mj-ea"/>
+                <a:cs typeface="+mj-cs"/>
+              </a:defRPr>
+            </a:lvl3pPr>
+            <a:lvl4pPr>
+              <a:defRPr>
+                <a:latin typeface="+mj-lt"/>
+                <a:ea typeface="+mj-ea"/>
+                <a:cs typeface="+mj-cs"/>
+              </a:defRPr>
+            </a:lvl4pPr>
+            <a:lvl5pPr>
+              <a:defRPr>
+                <a:latin typeface="+mj-lt"/>
+                <a:ea typeface="+mj-ea"/>
+                <a:cs typeface="+mj-cs"/>
+              </a:defRPr>
+            </a:lvl5pPr>
+            <a:lvl6pPr>
+              <a:defRPr>
+                <a:latin typeface="+mj-lt"/>
+                <a:ea typeface="+mj-ea"/>
+                <a:cs typeface="+mj-cs"/>
+              </a:defRPr>
+            </a:lvl6pPr>
+            <a:lvl7pPr>
+              <a:defRPr>
+                <a:latin typeface="+mj-lt"/>
+                <a:ea typeface="+mj-ea"/>
+                <a:cs typeface="+mj-cs"/>
+              </a:defRPr>
+            </a:lvl7pPr>
+            <a:lvl8pPr>
+              <a:defRPr>
+                <a:latin typeface="+mj-lt"/>
+                <a:ea typeface="+mj-ea"/>
+                <a:cs typeface="+mj-cs"/>
+              </a:defRPr>
+            </a:lvl8pPr>
+            <a:lvl9pPr>
+              <a:defRPr>
+                <a:latin typeface="+mj-lt"/>
+                <a:ea typeface="+mj-ea"/>
+                <a:cs typeface="+mj-cs"/>
+              </a:defRPr>
+            </a:lvl9pPr>
+          </a:lstStyle>
+          <a:p>
+            <a:pPr algn="ctr"/>
+            <a:r>
+              <a:rPr lang="en-US" sz="1100" dirty="0">
+                <a:latin typeface="Arial" panose="020B0604020202020204" pitchFamily="34" charset="0"/>
+                <a:cs typeface="Arial" panose="020B0604020202020204" pitchFamily="34" charset="0"/>
+              </a:rPr>
+              <a:t>Alarm Topic</a:t>
+            </a:r>
+          </a:p>
+        </p:txBody>
+      </p:sp>
+      <p:pic>
+        <p:nvPicPr>
+          <p:cNvPr id="71" name="Graphic 29">
+            <a:extLst>
+              <a:ext uri="{FF2B5EF4-FFF2-40B4-BE49-F238E27FC236}">
+                <a16:creationId xmlns:a16="http://schemas.microsoft.com/office/drawing/2014/main" id="{194FE4AA-2936-344D-A3E1-AE2EEFC27286}"/>
+              </a:ext>
+            </a:extLst>
+          </p:cNvPr>
+          <p:cNvPicPr>
+            <a:picLocks noChangeAspect="1" noChangeArrowheads="1"/>
+          </p:cNvPicPr>
+          <p:nvPr/>
+        </p:nvPicPr>
+        <p:blipFill>
+          <a:blip r:embed="rId10">
+            <a:extLst>
+              <a:ext uri="{28A0092B-C50C-407E-A947-70E740481C1C}">
+                <a14:useLocalDpi xmlns:a14="http://schemas.microsoft.com/office/drawing/2010/main" val="0"/>
+              </a:ext>
+            </a:extLst>
+          </a:blip>
+          <a:srcRect/>
+          <a:stretch>
+            <a:fillRect/>
+          </a:stretch>
+        </p:blipFill>
         <p:spPr bwMode="auto">
           <a:xfrm>
-            <a:off x="2366830" y="5029111"/>
-            <a:ext cx="1143852" cy="430887"/>
+            <a:off x="4225601" y="1189945"/>
+            <a:ext cx="457200" cy="457200"/>
           </a:xfrm>
           <a:prstGeom prst="rect">
             <a:avLst/>
@@ -6839,127 +6668,128 @@
             </a:ext>
           </a:extLst>
         </p:spPr>
-        <p:txBody>
-          <a:bodyPr wrap="square">
+      </p:pic>
+      <p:sp>
+        <p:nvSpPr>
+          <p:cNvPr id="73" name="TextBox 2">
+            <a:extLst>
+              <a:ext uri="{FF2B5EF4-FFF2-40B4-BE49-F238E27FC236}">
+                <a16:creationId xmlns:a16="http://schemas.microsoft.com/office/drawing/2014/main" id="{D007E6F1-DFB9-B848-B4EE-C8D278615335}"/>
+              </a:ext>
+            </a:extLst>
+          </p:cNvPr>
+          <p:cNvSpPr txBox="1"/>
+          <p:nvPr/>
+        </p:nvSpPr>
+        <p:spPr>
+          <a:xfrm>
+            <a:off x="3986795" y="1564434"/>
+            <a:ext cx="932275" cy="261610"/>
+          </a:xfrm>
+          <a:prstGeom prst="rect">
+            <a:avLst/>
+          </a:prstGeom>
+          <a:noFill/>
+        </p:spPr>
+        <p:style>
+          <a:lnRef idx="0">
+            <a:scrgbClr r="0" g="0" b="0"/>
+          </a:lnRef>
+          <a:fillRef idx="0">
+            <a:scrgbClr r="0" g="0" b="0"/>
+          </a:fillRef>
+          <a:effectRef idx="0">
+            <a:scrgbClr r="0" g="0" b="0"/>
+          </a:effectRef>
+          <a:fontRef idx="major"/>
+        </p:style>
+        <p:txBody>
+          <a:bodyPr wrap="square" rtlCol="0">
             <a:spAutoFit/>
           </a:bodyPr>
           <a:lstStyle>
             <a:lvl1pPr>
               <a:defRPr>
-                <a:solidFill>
-                  <a:schemeClr val="tx1"/>
-                </a:solidFill>
-                <a:latin typeface="Calibri" panose="020F0502020204030204" pitchFamily="34" charset="0"/>
+                <a:latin typeface="+mj-lt"/>
+                <a:ea typeface="+mj-ea"/>
+                <a:cs typeface="+mj-cs"/>
               </a:defRPr>
             </a:lvl1pPr>
-            <a:lvl2pPr marL="742950" indent="-285750">
-              <a:defRPr>
-                <a:solidFill>
-                  <a:schemeClr val="tx1"/>
-                </a:solidFill>
-                <a:latin typeface="Calibri" panose="020F0502020204030204" pitchFamily="34" charset="0"/>
+            <a:lvl2pPr>
+              <a:defRPr>
+                <a:latin typeface="+mj-lt"/>
+                <a:ea typeface="+mj-ea"/>
+                <a:cs typeface="+mj-cs"/>
               </a:defRPr>
             </a:lvl2pPr>
-            <a:lvl3pPr marL="1143000" indent="-228600">
-              <a:defRPr>
-                <a:solidFill>
-                  <a:schemeClr val="tx1"/>
-                </a:solidFill>
-                <a:latin typeface="Calibri" panose="020F0502020204030204" pitchFamily="34" charset="0"/>
+            <a:lvl3pPr>
+              <a:defRPr>
+                <a:latin typeface="+mj-lt"/>
+                <a:ea typeface="+mj-ea"/>
+                <a:cs typeface="+mj-cs"/>
               </a:defRPr>
             </a:lvl3pPr>
-            <a:lvl4pPr marL="1600200" indent="-228600">
-              <a:defRPr>
-                <a:solidFill>
-                  <a:schemeClr val="tx1"/>
-                </a:solidFill>
-                <a:latin typeface="Calibri" panose="020F0502020204030204" pitchFamily="34" charset="0"/>
+            <a:lvl4pPr>
+              <a:defRPr>
+                <a:latin typeface="+mj-lt"/>
+                <a:ea typeface="+mj-ea"/>
+                <a:cs typeface="+mj-cs"/>
               </a:defRPr>
             </a:lvl4pPr>
-            <a:lvl5pPr marL="2057400" indent="-228600">
-              <a:defRPr>
-                <a:solidFill>
-                  <a:schemeClr val="tx1"/>
-                </a:solidFill>
-                <a:latin typeface="Calibri" panose="020F0502020204030204" pitchFamily="34" charset="0"/>
+            <a:lvl5pPr>
+              <a:defRPr>
+                <a:latin typeface="+mj-lt"/>
+                <a:ea typeface="+mj-ea"/>
+                <a:cs typeface="+mj-cs"/>
               </a:defRPr>
             </a:lvl5pPr>
-            <a:lvl6pPr marL="2514600" indent="-228600" eaLnBrk="0" fontAlgn="base" hangingPunct="0">
-              <a:spcBef>
-                <a:spcPct val="0"/>
-              </a:spcBef>
-              <a:spcAft>
-                <a:spcPct val="0"/>
-              </a:spcAft>
-              <a:defRPr>
-                <a:solidFill>
-                  <a:schemeClr val="tx1"/>
-                </a:solidFill>
-                <a:latin typeface="Calibri" panose="020F0502020204030204" pitchFamily="34" charset="0"/>
+            <a:lvl6pPr>
+              <a:defRPr>
+                <a:latin typeface="+mj-lt"/>
+                <a:ea typeface="+mj-ea"/>
+                <a:cs typeface="+mj-cs"/>
               </a:defRPr>
             </a:lvl6pPr>
-            <a:lvl7pPr marL="2971800" indent="-228600" eaLnBrk="0" fontAlgn="base" hangingPunct="0">
-              <a:spcBef>
-                <a:spcPct val="0"/>
-              </a:spcBef>
-              <a:spcAft>
-                <a:spcPct val="0"/>
-              </a:spcAft>
-              <a:defRPr>
-                <a:solidFill>
-                  <a:schemeClr val="tx1"/>
-                </a:solidFill>
-                <a:latin typeface="Calibri" panose="020F0502020204030204" pitchFamily="34" charset="0"/>
+            <a:lvl7pPr>
+              <a:defRPr>
+                <a:latin typeface="+mj-lt"/>
+                <a:ea typeface="+mj-ea"/>
+                <a:cs typeface="+mj-cs"/>
               </a:defRPr>
             </a:lvl7pPr>
-            <a:lvl8pPr marL="3429000" indent="-228600" eaLnBrk="0" fontAlgn="base" hangingPunct="0">
-              <a:spcBef>
-                <a:spcPct val="0"/>
-              </a:spcBef>
-              <a:spcAft>
-                <a:spcPct val="0"/>
-              </a:spcAft>
-              <a:defRPr>
-                <a:solidFill>
-                  <a:schemeClr val="tx1"/>
-                </a:solidFill>
-                <a:latin typeface="Calibri" panose="020F0502020204030204" pitchFamily="34" charset="0"/>
+            <a:lvl8pPr>
+              <a:defRPr>
+                <a:latin typeface="+mj-lt"/>
+                <a:ea typeface="+mj-ea"/>
+                <a:cs typeface="+mj-cs"/>
               </a:defRPr>
             </a:lvl8pPr>
-            <a:lvl9pPr marL="3886200" indent="-228600" eaLnBrk="0" fontAlgn="base" hangingPunct="0">
-              <a:spcBef>
-                <a:spcPct val="0"/>
-              </a:spcBef>
-              <a:spcAft>
-                <a:spcPct val="0"/>
-              </a:spcAft>
-              <a:defRPr>
-                <a:solidFill>
-                  <a:schemeClr val="tx1"/>
-                </a:solidFill>
-                <a:latin typeface="Calibri" panose="020F0502020204030204" pitchFamily="34" charset="0"/>
+            <a:lvl9pPr>
+              <a:defRPr>
+                <a:latin typeface="+mj-lt"/>
+                <a:ea typeface="+mj-ea"/>
+                <a:cs typeface="+mj-cs"/>
               </a:defRPr>
             </a:lvl9pPr>
           </a:lstStyle>
           <a:p>
-            <a:pPr algn="ctr" eaLnBrk="1" hangingPunct="1"/>
-            <a:r>
-              <a:rPr lang="en-US" altLang="en-US" sz="1100" dirty="0">
+            <a:pPr algn="ctr"/>
+            <a:r>
+              <a:rPr lang="en-US" sz="1100" dirty="0">
                 <a:latin typeface="Arial" panose="020B0604020202020204" pitchFamily="34" charset="0"/>
-                <a:ea typeface="Amazon Ember" panose="020B0603020204020204" pitchFamily="34" charset="0"/>
                 <a:cs typeface="Arial" panose="020B0604020202020204" pitchFamily="34" charset="0"/>
               </a:rPr>
-              <a:t>Global Event Rules</a:t>
-            </a:r>
-          </a:p>
-        </p:txBody>
-      </p:sp>
-      <p:sp>
-        <p:nvSpPr>
-          <p:cNvPr id="68" name="Oval 67">
-            <a:extLst>
-              <a:ext uri="{FF2B5EF4-FFF2-40B4-BE49-F238E27FC236}">
-                <a16:creationId xmlns:a16="http://schemas.microsoft.com/office/drawing/2014/main" id="{B2F2B0A9-E50F-F141-8975-4E45BF614C42}"/>
+              <a:t>DLQ</a:t>
+            </a:r>
+          </a:p>
+        </p:txBody>
+      </p:sp>
+      <p:sp>
+        <p:nvSpPr>
+          <p:cNvPr id="74" name="Oval 73">
+            <a:extLst>
+              <a:ext uri="{FF2B5EF4-FFF2-40B4-BE49-F238E27FC236}">
+                <a16:creationId xmlns:a16="http://schemas.microsoft.com/office/drawing/2014/main" id="{C01BE76D-84FD-E447-9ECA-31AE37CC4949}"/>
               </a:ext>
             </a:extLst>
           </p:cNvPr>
@@ -6968,7 +6798,7 @@
         </p:nvSpPr>
         <p:spPr>
           <a:xfrm>
-            <a:off x="2529063" y="4512566"/>
+            <a:off x="4103815" y="1203865"/>
             <a:ext cx="253435" cy="212902"/>
           </a:xfrm>
           <a:prstGeom prst="ellipse">
@@ -7009,367 +6839,58 @@
                 <a:latin typeface="Arial" panose="020B0604020202020204" pitchFamily="34" charset="0"/>
                 <a:cs typeface="Arial" panose="020B0604020202020204" pitchFamily="34" charset="0"/>
               </a:rPr>
-              <a:t>1.4</a:t>
-            </a:r>
-          </a:p>
-        </p:txBody>
-      </p:sp>
-      <p:pic>
-        <p:nvPicPr>
-          <p:cNvPr id="69" name="Graphic 17">
-            <a:extLst>
-              <a:ext uri="{FF2B5EF4-FFF2-40B4-BE49-F238E27FC236}">
-                <a16:creationId xmlns:a16="http://schemas.microsoft.com/office/drawing/2014/main" id="{EF435EE0-6B48-DF4D-BA0F-ABF4A4C17738}"/>
-              </a:ext>
-            </a:extLst>
-          </p:cNvPr>
-          <p:cNvPicPr>
-            <a:picLocks noChangeAspect="1" noChangeArrowheads="1"/>
-          </p:cNvPicPr>
+              <a:t>1.5</a:t>
+            </a:r>
+          </a:p>
+        </p:txBody>
+      </p:sp>
+      <p:cxnSp>
+        <p:nvCxnSpPr>
+          <p:cNvPr id="77" name="Straight Arrow Connector 76">
+            <a:extLst>
+              <a:ext uri="{FF2B5EF4-FFF2-40B4-BE49-F238E27FC236}">
+                <a16:creationId xmlns:a16="http://schemas.microsoft.com/office/drawing/2014/main" id="{CF4820BB-6C7D-4B4A-ABA0-5D456AB281B9}"/>
+              </a:ext>
+            </a:extLst>
+          </p:cNvPr>
+          <p:cNvCxnSpPr>
+            <a:cxnSpLocks/>
+          </p:cNvCxnSpPr>
           <p:nvPr/>
-        </p:nvPicPr>
-        <p:blipFill>
-          <a:blip r:embed="rId11">
-            <a:extLst>
-              <a:ext uri="{28A0092B-C50C-407E-A947-70E740481C1C}">
-                <a14:useLocalDpi xmlns:a14="http://schemas.microsoft.com/office/drawing/2010/main" val="0"/>
-              </a:ext>
-            </a:extLst>
-          </a:blip>
-          <a:srcRect/>
-          <a:stretch>
-            <a:fillRect/>
-          </a:stretch>
-        </p:blipFill>
-        <p:spPr bwMode="auto">
-          <a:xfrm>
-            <a:off x="5476681" y="1190331"/>
-            <a:ext cx="457200" cy="457200"/>
-          </a:xfrm>
-          <a:prstGeom prst="rect">
+        </p:nvCxnSpPr>
+        <p:spPr>
+          <a:xfrm>
+            <a:off x="4858784" y="1418931"/>
+            <a:ext cx="400920" cy="0"/>
+          </a:xfrm>
+          <a:prstGeom prst="straightConnector1">
             <a:avLst/>
           </a:prstGeom>
-          <a:noFill/>
           <a:ln>
-            <a:noFill/>
+            <a:tailEnd type="triangle"/>
           </a:ln>
-          <a:extLst>
-            <a:ext uri="{909E8E84-426E-40DD-AFC4-6F175D3DCCD1}">
-              <a14:hiddenFill xmlns:a14="http://schemas.microsoft.com/office/drawing/2010/main">
-                <a:solidFill>
-                  <a:srgbClr val="FFFFFF"/>
-                </a:solidFill>
-              </a14:hiddenFill>
-            </a:ext>
-            <a:ext uri="{91240B29-F687-4F45-9708-019B960494DF}">
-              <a14:hiddenLine xmlns:a14="http://schemas.microsoft.com/office/drawing/2010/main" w="9525">
-                <a:solidFill>
-                  <a:srgbClr val="000000"/>
-                </a:solidFill>
-                <a:miter lim="800000"/>
-                <a:headEnd/>
-                <a:tailEnd/>
-              </a14:hiddenLine>
-            </a:ext>
-          </a:extLst>
-        </p:spPr>
-      </p:pic>
-      <p:sp>
-        <p:nvSpPr>
-          <p:cNvPr id="70" name="TextBox 2">
-            <a:extLst>
-              <a:ext uri="{FF2B5EF4-FFF2-40B4-BE49-F238E27FC236}">
-                <a16:creationId xmlns:a16="http://schemas.microsoft.com/office/drawing/2014/main" id="{AAC8ED0A-7591-EA46-B9A9-432BF3E6CCFC}"/>
-              </a:ext>
-            </a:extLst>
-          </p:cNvPr>
-          <p:cNvSpPr txBox="1"/>
-          <p:nvPr/>
-        </p:nvSpPr>
-        <p:spPr>
-          <a:xfrm>
-            <a:off x="5242156" y="1592361"/>
-            <a:ext cx="932275" cy="261610"/>
-          </a:xfrm>
-          <a:prstGeom prst="rect">
-            <a:avLst/>
-          </a:prstGeom>
-          <a:noFill/>
         </p:spPr>
         <p:style>
-          <a:lnRef idx="0">
-            <a:scrgbClr r="0" g="0" b="0"/>
+          <a:lnRef idx="1">
+            <a:schemeClr val="dk1"/>
           </a:lnRef>
           <a:fillRef idx="0">
-            <a:scrgbClr r="0" g="0" b="0"/>
+            <a:schemeClr val="dk1"/>
           </a:fillRef>
           <a:effectRef idx="0">
-            <a:scrgbClr r="0" g="0" b="0"/>
+            <a:schemeClr val="dk1"/>
           </a:effectRef>
-          <a:fontRef idx="major"/>
+          <a:fontRef idx="minor">
+            <a:schemeClr val="tx1"/>
+          </a:fontRef>
         </p:style>
-        <p:txBody>
-          <a:bodyPr wrap="square" rtlCol="0">
-            <a:spAutoFit/>
-          </a:bodyPr>
-          <a:lstStyle>
-            <a:lvl1pPr>
-              <a:defRPr>
-                <a:latin typeface="+mj-lt"/>
-                <a:ea typeface="+mj-ea"/>
-                <a:cs typeface="+mj-cs"/>
-              </a:defRPr>
-            </a:lvl1pPr>
-            <a:lvl2pPr>
-              <a:defRPr>
-                <a:latin typeface="+mj-lt"/>
-                <a:ea typeface="+mj-ea"/>
-                <a:cs typeface="+mj-cs"/>
-              </a:defRPr>
-            </a:lvl2pPr>
-            <a:lvl3pPr>
-              <a:defRPr>
-                <a:latin typeface="+mj-lt"/>
-                <a:ea typeface="+mj-ea"/>
-                <a:cs typeface="+mj-cs"/>
-              </a:defRPr>
-            </a:lvl3pPr>
-            <a:lvl4pPr>
-              <a:defRPr>
-                <a:latin typeface="+mj-lt"/>
-                <a:ea typeface="+mj-ea"/>
-                <a:cs typeface="+mj-cs"/>
-              </a:defRPr>
-            </a:lvl4pPr>
-            <a:lvl5pPr>
-              <a:defRPr>
-                <a:latin typeface="+mj-lt"/>
-                <a:ea typeface="+mj-ea"/>
-                <a:cs typeface="+mj-cs"/>
-              </a:defRPr>
-            </a:lvl5pPr>
-            <a:lvl6pPr>
-              <a:defRPr>
-                <a:latin typeface="+mj-lt"/>
-                <a:ea typeface="+mj-ea"/>
-                <a:cs typeface="+mj-cs"/>
-              </a:defRPr>
-            </a:lvl6pPr>
-            <a:lvl7pPr>
-              <a:defRPr>
-                <a:latin typeface="+mj-lt"/>
-                <a:ea typeface="+mj-ea"/>
-                <a:cs typeface="+mj-cs"/>
-              </a:defRPr>
-            </a:lvl7pPr>
-            <a:lvl8pPr>
-              <a:defRPr>
-                <a:latin typeface="+mj-lt"/>
-                <a:ea typeface="+mj-ea"/>
-                <a:cs typeface="+mj-cs"/>
-              </a:defRPr>
-            </a:lvl8pPr>
-            <a:lvl9pPr>
-              <a:defRPr>
-                <a:latin typeface="+mj-lt"/>
-                <a:ea typeface="+mj-ea"/>
-                <a:cs typeface="+mj-cs"/>
-              </a:defRPr>
-            </a:lvl9pPr>
-          </a:lstStyle>
-          <a:p>
-            <a:pPr algn="ctr"/>
-            <a:r>
-              <a:rPr lang="en-US" sz="1100" dirty="0">
-                <a:latin typeface="Arial" panose="020B0604020202020204" pitchFamily="34" charset="0"/>
-                <a:cs typeface="Arial" panose="020B0604020202020204" pitchFamily="34" charset="0"/>
-              </a:rPr>
-              <a:t>Alarm Topic</a:t>
-            </a:r>
-          </a:p>
-        </p:txBody>
-      </p:sp>
-      <p:pic>
-        <p:nvPicPr>
-          <p:cNvPr id="71" name="Graphic 29">
-            <a:extLst>
-              <a:ext uri="{FF2B5EF4-FFF2-40B4-BE49-F238E27FC236}">
-                <a16:creationId xmlns:a16="http://schemas.microsoft.com/office/drawing/2014/main" id="{194FE4AA-2936-344D-A3E1-AE2EEFC27286}"/>
-              </a:ext>
-            </a:extLst>
-          </p:cNvPr>
-          <p:cNvPicPr>
-            <a:picLocks noChangeAspect="1" noChangeArrowheads="1"/>
-          </p:cNvPicPr>
-          <p:nvPr/>
-        </p:nvPicPr>
-        <p:blipFill>
-          <a:blip r:embed="rId12">
-            <a:extLst>
-              <a:ext uri="{28A0092B-C50C-407E-A947-70E740481C1C}">
-                <a14:useLocalDpi xmlns:a14="http://schemas.microsoft.com/office/drawing/2010/main" val="0"/>
-              </a:ext>
-            </a:extLst>
-          </a:blip>
-          <a:srcRect/>
-          <a:stretch>
-            <a:fillRect/>
-          </a:stretch>
-        </p:blipFill>
-        <p:spPr bwMode="auto">
-          <a:xfrm>
-            <a:off x="4225601" y="1189945"/>
-            <a:ext cx="457200" cy="457200"/>
-          </a:xfrm>
-          <a:prstGeom prst="rect">
-            <a:avLst/>
-          </a:prstGeom>
-          <a:noFill/>
-          <a:ln>
-            <a:noFill/>
-          </a:ln>
-          <a:extLst>
-            <a:ext uri="{909E8E84-426E-40DD-AFC4-6F175D3DCCD1}">
-              <a14:hiddenFill xmlns:a14="http://schemas.microsoft.com/office/drawing/2010/main">
-                <a:solidFill>
-                  <a:srgbClr val="FFFFFF"/>
-                </a:solidFill>
-              </a14:hiddenFill>
-            </a:ext>
-            <a:ext uri="{91240B29-F687-4F45-9708-019B960494DF}">
-              <a14:hiddenLine xmlns:a14="http://schemas.microsoft.com/office/drawing/2010/main" w="9525">
-                <a:solidFill>
-                  <a:srgbClr val="000000"/>
-                </a:solidFill>
-                <a:miter lim="800000"/>
-                <a:headEnd/>
-                <a:tailEnd/>
-              </a14:hiddenLine>
-            </a:ext>
-          </a:extLst>
-        </p:spPr>
-      </p:pic>
-      <p:sp>
-        <p:nvSpPr>
-          <p:cNvPr id="73" name="TextBox 2">
-            <a:extLst>
-              <a:ext uri="{FF2B5EF4-FFF2-40B4-BE49-F238E27FC236}">
-                <a16:creationId xmlns:a16="http://schemas.microsoft.com/office/drawing/2014/main" id="{D007E6F1-DFB9-B848-B4EE-C8D278615335}"/>
-              </a:ext>
-            </a:extLst>
-          </p:cNvPr>
-          <p:cNvSpPr txBox="1"/>
-          <p:nvPr/>
-        </p:nvSpPr>
-        <p:spPr>
-          <a:xfrm>
-            <a:off x="3986795" y="1564434"/>
-            <a:ext cx="932275" cy="261610"/>
-          </a:xfrm>
-          <a:prstGeom prst="rect">
-            <a:avLst/>
-          </a:prstGeom>
-          <a:noFill/>
-        </p:spPr>
-        <p:style>
-          <a:lnRef idx="0">
-            <a:scrgbClr r="0" g="0" b="0"/>
-          </a:lnRef>
-          <a:fillRef idx="0">
-            <a:scrgbClr r="0" g="0" b="0"/>
-          </a:fillRef>
-          <a:effectRef idx="0">
-            <a:scrgbClr r="0" g="0" b="0"/>
-          </a:effectRef>
-          <a:fontRef idx="major"/>
-        </p:style>
-        <p:txBody>
-          <a:bodyPr wrap="square" rtlCol="0">
-            <a:spAutoFit/>
-          </a:bodyPr>
-          <a:lstStyle>
-            <a:lvl1pPr>
-              <a:defRPr>
-                <a:latin typeface="+mj-lt"/>
-                <a:ea typeface="+mj-ea"/>
-                <a:cs typeface="+mj-cs"/>
-              </a:defRPr>
-            </a:lvl1pPr>
-            <a:lvl2pPr>
-              <a:defRPr>
-                <a:latin typeface="+mj-lt"/>
-                <a:ea typeface="+mj-ea"/>
-                <a:cs typeface="+mj-cs"/>
-              </a:defRPr>
-            </a:lvl2pPr>
-            <a:lvl3pPr>
-              <a:defRPr>
-                <a:latin typeface="+mj-lt"/>
-                <a:ea typeface="+mj-ea"/>
-                <a:cs typeface="+mj-cs"/>
-              </a:defRPr>
-            </a:lvl3pPr>
-            <a:lvl4pPr>
-              <a:defRPr>
-                <a:latin typeface="+mj-lt"/>
-                <a:ea typeface="+mj-ea"/>
-                <a:cs typeface="+mj-cs"/>
-              </a:defRPr>
-            </a:lvl4pPr>
-            <a:lvl5pPr>
-              <a:defRPr>
-                <a:latin typeface="+mj-lt"/>
-                <a:ea typeface="+mj-ea"/>
-                <a:cs typeface="+mj-cs"/>
-              </a:defRPr>
-            </a:lvl5pPr>
-            <a:lvl6pPr>
-              <a:defRPr>
-                <a:latin typeface="+mj-lt"/>
-                <a:ea typeface="+mj-ea"/>
-                <a:cs typeface="+mj-cs"/>
-              </a:defRPr>
-            </a:lvl6pPr>
-            <a:lvl7pPr>
-              <a:defRPr>
-                <a:latin typeface="+mj-lt"/>
-                <a:ea typeface="+mj-ea"/>
-                <a:cs typeface="+mj-cs"/>
-              </a:defRPr>
-            </a:lvl7pPr>
-            <a:lvl8pPr>
-              <a:defRPr>
-                <a:latin typeface="+mj-lt"/>
-                <a:ea typeface="+mj-ea"/>
-                <a:cs typeface="+mj-cs"/>
-              </a:defRPr>
-            </a:lvl8pPr>
-            <a:lvl9pPr>
-              <a:defRPr>
-                <a:latin typeface="+mj-lt"/>
-                <a:ea typeface="+mj-ea"/>
-                <a:cs typeface="+mj-cs"/>
-              </a:defRPr>
-            </a:lvl9pPr>
-          </a:lstStyle>
-          <a:p>
-            <a:pPr algn="ctr"/>
-            <a:r>
-              <a:rPr lang="en-US" sz="1100" dirty="0">
-                <a:latin typeface="Arial" panose="020B0604020202020204" pitchFamily="34" charset="0"/>
-                <a:cs typeface="Arial" panose="020B0604020202020204" pitchFamily="34" charset="0"/>
-              </a:rPr>
-              <a:t>DLQ</a:t>
-            </a:r>
-          </a:p>
-        </p:txBody>
-      </p:sp>
-      <p:sp>
-        <p:nvSpPr>
-          <p:cNvPr id="74" name="Oval 73">
-            <a:extLst>
-              <a:ext uri="{FF2B5EF4-FFF2-40B4-BE49-F238E27FC236}">
-                <a16:creationId xmlns:a16="http://schemas.microsoft.com/office/drawing/2014/main" id="{C01BE76D-84FD-E447-9ECA-31AE37CC4949}"/>
+      </p:cxnSp>
+      <p:sp>
+        <p:nvSpPr>
+          <p:cNvPr id="78" name="Oval 77">
+            <a:extLst>
+              <a:ext uri="{FF2B5EF4-FFF2-40B4-BE49-F238E27FC236}">
+                <a16:creationId xmlns:a16="http://schemas.microsoft.com/office/drawing/2014/main" id="{6D444918-7362-8849-9895-4FD3F7BB7C2A}"/>
               </a:ext>
             </a:extLst>
           </p:cNvPr>
@@ -7378,7 +6899,7 @@
         </p:nvSpPr>
         <p:spPr>
           <a:xfrm>
-            <a:off x="4066185" y="1233969"/>
+            <a:off x="5776914" y="1131825"/>
             <a:ext cx="253435" cy="212902"/>
           </a:xfrm>
           <a:prstGeom prst="ellipse">
@@ -7419,107 +6940,6 @@
                 <a:latin typeface="Arial" panose="020B0604020202020204" pitchFamily="34" charset="0"/>
                 <a:cs typeface="Arial" panose="020B0604020202020204" pitchFamily="34" charset="0"/>
               </a:rPr>
-              <a:t>1.5</a:t>
-            </a:r>
-          </a:p>
-        </p:txBody>
-      </p:sp>
-      <p:cxnSp>
-        <p:nvCxnSpPr>
-          <p:cNvPr id="77" name="Straight Arrow Connector 76">
-            <a:extLst>
-              <a:ext uri="{FF2B5EF4-FFF2-40B4-BE49-F238E27FC236}">
-                <a16:creationId xmlns:a16="http://schemas.microsoft.com/office/drawing/2014/main" id="{CF4820BB-6C7D-4B4A-ABA0-5D456AB281B9}"/>
-              </a:ext>
-            </a:extLst>
-          </p:cNvPr>
-          <p:cNvCxnSpPr>
-            <a:cxnSpLocks/>
-          </p:cNvCxnSpPr>
-          <p:nvPr/>
-        </p:nvCxnSpPr>
-        <p:spPr>
-          <a:xfrm>
-            <a:off x="4858784" y="1418931"/>
-            <a:ext cx="400920" cy="0"/>
-          </a:xfrm>
-          <a:prstGeom prst="straightConnector1">
-            <a:avLst/>
-          </a:prstGeom>
-          <a:ln>
-            <a:tailEnd type="triangle"/>
-          </a:ln>
-        </p:spPr>
-        <p:style>
-          <a:lnRef idx="1">
-            <a:schemeClr val="dk1"/>
-          </a:lnRef>
-          <a:fillRef idx="0">
-            <a:schemeClr val="dk1"/>
-          </a:fillRef>
-          <a:effectRef idx="0">
-            <a:schemeClr val="dk1"/>
-          </a:effectRef>
-          <a:fontRef idx="minor">
-            <a:schemeClr val="tx1"/>
-          </a:fontRef>
-        </p:style>
-      </p:cxnSp>
-      <p:sp>
-        <p:nvSpPr>
-          <p:cNvPr id="78" name="Oval 77">
-            <a:extLst>
-              <a:ext uri="{FF2B5EF4-FFF2-40B4-BE49-F238E27FC236}">
-                <a16:creationId xmlns:a16="http://schemas.microsoft.com/office/drawing/2014/main" id="{6D444918-7362-8849-9895-4FD3F7BB7C2A}"/>
-              </a:ext>
-            </a:extLst>
-          </p:cNvPr>
-          <p:cNvSpPr/>
-          <p:nvPr/>
-        </p:nvSpPr>
-        <p:spPr>
-          <a:xfrm>
-            <a:off x="5521030" y="1244715"/>
-            <a:ext cx="253435" cy="212902"/>
-          </a:xfrm>
-          <a:prstGeom prst="ellipse">
-            <a:avLst/>
-          </a:prstGeom>
-          <a:solidFill>
-            <a:schemeClr val="tx1"/>
-          </a:solidFill>
-          <a:ln>
-            <a:solidFill>
-              <a:schemeClr val="tx1"/>
-            </a:solidFill>
-          </a:ln>
-        </p:spPr>
-        <p:style>
-          <a:lnRef idx="2">
-            <a:schemeClr val="accent1">
-              <a:shade val="50000"/>
-            </a:schemeClr>
-          </a:lnRef>
-          <a:fillRef idx="1">
-            <a:schemeClr val="accent1"/>
-          </a:fillRef>
-          <a:effectRef idx="0">
-            <a:schemeClr val="accent1"/>
-          </a:effectRef>
-          <a:fontRef idx="minor">
-            <a:schemeClr val="lt1"/>
-          </a:fontRef>
-        </p:style>
-        <p:txBody>
-          <a:bodyPr lIns="0" tIns="0" rIns="0" bIns="0" rtlCol="0" anchor="ctr"/>
-          <a:lstStyle/>
-          <a:p>
-            <a:pPr algn="ctr"/>
-            <a:r>
-              <a:rPr lang="en-US" sz="800" dirty="0">
-                <a:latin typeface="Arial" panose="020B0604020202020204" pitchFamily="34" charset="0"/>
-                <a:cs typeface="Arial" panose="020B0604020202020204" pitchFamily="34" charset="0"/>
-              </a:rPr>
               <a:t>1.8</a:t>
             </a:r>
           </a:p>
@@ -7540,7 +6960,7 @@
           <p:nvPr/>
         </p:nvPicPr>
         <p:blipFill>
-          <a:blip r:embed="rId11">
+          <a:blip r:embed="rId9">
             <a:extLst>
               <a:ext uri="{28A0092B-C50C-407E-A947-70E740481C1C}">
                 <a14:useLocalDpi xmlns:a14="http://schemas.microsoft.com/office/drawing/2010/main" val="0"/>
@@ -7714,7 +7134,7 @@
         </p:nvSpPr>
         <p:spPr>
           <a:xfrm>
-            <a:off x="5526124" y="3505349"/>
+            <a:off x="5789534" y="3396222"/>
             <a:ext cx="253435" cy="212902"/>
           </a:xfrm>
           <a:prstGeom prst="ellipse">
@@ -7898,7 +7318,7 @@
         </p:nvSpPr>
         <p:spPr>
           <a:xfrm>
-            <a:off x="6193886" y="2386359"/>
+            <a:off x="6513741" y="2284758"/>
             <a:ext cx="300569" cy="204616"/>
           </a:xfrm>
           <a:prstGeom prst="ellipse">
@@ -7944,10 +7364,793 @@
           </a:p>
         </p:txBody>
       </p:sp>
+      <p:pic>
+        <p:nvPicPr>
+          <p:cNvPr id="76" name="Graphic 75">
+            <a:extLst>
+              <a:ext uri="{FF2B5EF4-FFF2-40B4-BE49-F238E27FC236}">
+                <a16:creationId xmlns:a16="http://schemas.microsoft.com/office/drawing/2014/main" id="{47198D56-FCF1-4694-AFAB-9DFE4DA509F8}"/>
+              </a:ext>
+            </a:extLst>
+          </p:cNvPr>
+          <p:cNvPicPr>
+            <a:picLocks noChangeAspect="1"/>
+          </p:cNvPicPr>
+          <p:nvPr/>
+        </p:nvPicPr>
+        <p:blipFill>
+          <a:blip r:embed="rId11">
+            <a:extLst>
+              <a:ext uri="{96DAC541-7B7A-43D3-8B79-37D633B846F1}">
+                <asvg:svgBlip xmlns:asvg="http://schemas.microsoft.com/office/drawing/2016/SVG/main" r:embed="rId12"/>
+              </a:ext>
+            </a:extLst>
+          </a:blip>
+          <a:srcRect/>
+          <a:stretch/>
+        </p:blipFill>
+        <p:spPr>
+          <a:xfrm>
+            <a:off x="481659" y="199795"/>
+            <a:ext cx="382834" cy="382834"/>
+          </a:xfrm>
+          <a:prstGeom prst="rect">
+            <a:avLst/>
+          </a:prstGeom>
+        </p:spPr>
+      </p:pic>
+      <p:sp>
+        <p:nvSpPr>
+          <p:cNvPr id="82" name="Rectangle 81">
+            <a:extLst>
+              <a:ext uri="{FF2B5EF4-FFF2-40B4-BE49-F238E27FC236}">
+                <a16:creationId xmlns:a16="http://schemas.microsoft.com/office/drawing/2014/main" id="{5BECD41A-13B8-4046-93CF-2115C9C30E30}"/>
+              </a:ext>
+            </a:extLst>
+          </p:cNvPr>
+          <p:cNvSpPr/>
+          <p:nvPr/>
+        </p:nvSpPr>
+        <p:spPr>
+          <a:xfrm>
+            <a:off x="1311203" y="961325"/>
+            <a:ext cx="5605459" cy="3409580"/>
+          </a:xfrm>
+          <a:prstGeom prst="rect">
+            <a:avLst/>
+          </a:prstGeom>
+          <a:noFill/>
+          <a:ln w="12700">
+            <a:solidFill>
+              <a:srgbClr val="5B9CD5"/>
+            </a:solidFill>
+            <a:prstDash val="sysDash"/>
+          </a:ln>
+        </p:spPr>
+        <p:style>
+          <a:lnRef idx="2">
+            <a:schemeClr val="accent1">
+              <a:shade val="50000"/>
+            </a:schemeClr>
+          </a:lnRef>
+          <a:fillRef idx="1">
+            <a:schemeClr val="accent1"/>
+          </a:fillRef>
+          <a:effectRef idx="0">
+            <a:schemeClr val="accent1"/>
+          </a:effectRef>
+          <a:fontRef idx="minor">
+            <a:schemeClr val="lt1"/>
+          </a:fontRef>
+        </p:style>
+        <p:txBody>
+          <a:bodyPr lIns="502920" tIns="91440"/>
+          <a:lstStyle/>
+          <a:p>
+            <a:pPr eaLnBrk="1" fontAlgn="auto" hangingPunct="1">
+              <a:spcBef>
+                <a:spcPts val="0"/>
+              </a:spcBef>
+              <a:spcAft>
+                <a:spcPts val="0"/>
+              </a:spcAft>
+              <a:defRPr/>
+            </a:pPr>
+            <a:r>
+              <a:rPr lang="en-US" sz="1200" dirty="0">
+                <a:solidFill>
+                  <a:srgbClr val="5B9CD5"/>
+                </a:solidFill>
+                <a:latin typeface="Arial" panose="020B0604020202020204" pitchFamily="34" charset="0"/>
+                <a:cs typeface="Arial" panose="020B0604020202020204" pitchFamily="34" charset="0"/>
+              </a:rPr>
+              <a:t>Home Region</a:t>
+            </a:r>
+          </a:p>
+        </p:txBody>
+      </p:sp>
+      <p:pic>
+        <p:nvPicPr>
+          <p:cNvPr id="87" name="Graphic 86">
+            <a:extLst>
+              <a:ext uri="{FF2B5EF4-FFF2-40B4-BE49-F238E27FC236}">
+                <a16:creationId xmlns:a16="http://schemas.microsoft.com/office/drawing/2014/main" id="{B001A60D-429C-4409-BF59-80A1BA576A7A}"/>
+              </a:ext>
+            </a:extLst>
+          </p:cNvPr>
+          <p:cNvPicPr>
+            <a:picLocks noChangeAspect="1"/>
+          </p:cNvPicPr>
+          <p:nvPr/>
+        </p:nvPicPr>
+        <p:blipFill>
+          <a:blip r:embed="rId13">
+            <a:extLst>
+              <a:ext uri="{96DAC541-7B7A-43D3-8B79-37D633B846F1}">
+                <asvg:svgBlip xmlns:asvg="http://schemas.microsoft.com/office/drawing/2016/SVG/main" r:embed="rId14"/>
+              </a:ext>
+            </a:extLst>
+          </a:blip>
+          <a:stretch>
+            <a:fillRect/>
+          </a:stretch>
+        </p:blipFill>
+        <p:spPr>
+          <a:xfrm>
+            <a:off x="1302259" y="954831"/>
+            <a:ext cx="391567" cy="391567"/>
+          </a:xfrm>
+          <a:prstGeom prst="rect">
+            <a:avLst/>
+          </a:prstGeom>
+        </p:spPr>
+      </p:pic>
+      <p:sp>
+        <p:nvSpPr>
+          <p:cNvPr id="88" name="Rectangle 87">
+            <a:extLst>
+              <a:ext uri="{FF2B5EF4-FFF2-40B4-BE49-F238E27FC236}">
+                <a16:creationId xmlns:a16="http://schemas.microsoft.com/office/drawing/2014/main" id="{12AB61F3-6E89-43B2-A3DB-F7352EA7CE57}"/>
+              </a:ext>
+            </a:extLst>
+          </p:cNvPr>
+          <p:cNvSpPr/>
+          <p:nvPr/>
+        </p:nvSpPr>
+        <p:spPr>
+          <a:xfrm>
+            <a:off x="897716" y="562066"/>
+            <a:ext cx="6137746" cy="5017467"/>
+          </a:xfrm>
+          <a:prstGeom prst="rect">
+            <a:avLst/>
+          </a:prstGeom>
+          <a:noFill/>
+          <a:ln w="12700">
+            <a:solidFill>
+              <a:srgbClr val="CD2264"/>
+            </a:solidFill>
+          </a:ln>
+        </p:spPr>
+        <p:style>
+          <a:lnRef idx="2">
+            <a:schemeClr val="accent1">
+              <a:shade val="50000"/>
+            </a:schemeClr>
+          </a:lnRef>
+          <a:fillRef idx="1">
+            <a:schemeClr val="accent1"/>
+          </a:fillRef>
+          <a:effectRef idx="0">
+            <a:schemeClr val="accent1"/>
+          </a:effectRef>
+          <a:fontRef idx="minor">
+            <a:schemeClr val="lt1"/>
+          </a:fontRef>
+        </p:style>
+        <p:txBody>
+          <a:bodyPr lIns="502920" tIns="91440"/>
+          <a:lstStyle/>
+          <a:p>
+            <a:pPr eaLnBrk="1" fontAlgn="auto" hangingPunct="1">
+              <a:spcBef>
+                <a:spcPts val="0"/>
+              </a:spcBef>
+              <a:spcAft>
+                <a:spcPts val="0"/>
+              </a:spcAft>
+              <a:defRPr/>
+            </a:pPr>
+            <a:r>
+              <a:rPr lang="en-US" sz="1200" dirty="0">
+                <a:solidFill>
+                  <a:srgbClr val="CD2264"/>
+                </a:solidFill>
+                <a:latin typeface="Arial" panose="020B0604020202020204" pitchFamily="34" charset="0"/>
+                <a:cs typeface="Arial" panose="020B0604020202020204" pitchFamily="34" charset="0"/>
+              </a:rPr>
+              <a:t>Organization Management Account (OU: Root)</a:t>
+            </a:r>
+          </a:p>
+        </p:txBody>
+      </p:sp>
+      <p:pic>
+        <p:nvPicPr>
+          <p:cNvPr id="89" name="Graphic 88">
+            <a:extLst>
+              <a:ext uri="{FF2B5EF4-FFF2-40B4-BE49-F238E27FC236}">
+                <a16:creationId xmlns:a16="http://schemas.microsoft.com/office/drawing/2014/main" id="{9FA5A99F-A131-4E8A-B5F4-1D2542DB2262}"/>
+              </a:ext>
+            </a:extLst>
+          </p:cNvPr>
+          <p:cNvPicPr>
+            <a:picLocks noChangeAspect="1"/>
+          </p:cNvPicPr>
+          <p:nvPr/>
+        </p:nvPicPr>
+        <p:blipFill>
+          <a:blip r:embed="rId15">
+            <a:extLst>
+              <a:ext uri="{96DAC541-7B7A-43D3-8B79-37D633B846F1}">
+                <asvg:svgBlip xmlns:asvg="http://schemas.microsoft.com/office/drawing/2016/SVG/main" r:embed="rId16"/>
+              </a:ext>
+            </a:extLst>
+          </a:blip>
+          <a:stretch>
+            <a:fillRect/>
+          </a:stretch>
+        </p:blipFill>
+        <p:spPr>
+          <a:xfrm>
+            <a:off x="894699" y="562066"/>
+            <a:ext cx="381000" cy="381000"/>
+          </a:xfrm>
+          <a:prstGeom prst="rect">
+            <a:avLst/>
+          </a:prstGeom>
+        </p:spPr>
+      </p:pic>
+      <p:sp>
+        <p:nvSpPr>
+          <p:cNvPr id="90" name="Rectangle 89">
+            <a:extLst>
+              <a:ext uri="{FF2B5EF4-FFF2-40B4-BE49-F238E27FC236}">
+                <a16:creationId xmlns:a16="http://schemas.microsoft.com/office/drawing/2014/main" id="{A6F4015F-0826-414C-B706-3CC6BA01A60B}"/>
+              </a:ext>
+            </a:extLst>
+          </p:cNvPr>
+          <p:cNvSpPr/>
+          <p:nvPr/>
+        </p:nvSpPr>
+        <p:spPr>
+          <a:xfrm>
+            <a:off x="1315353" y="4462325"/>
+            <a:ext cx="5601310" cy="972968"/>
+          </a:xfrm>
+          <a:prstGeom prst="rect">
+            <a:avLst/>
+          </a:prstGeom>
+          <a:noFill/>
+          <a:ln w="12700">
+            <a:solidFill>
+              <a:srgbClr val="5B9CD5"/>
+            </a:solidFill>
+            <a:prstDash val="sysDash"/>
+          </a:ln>
+        </p:spPr>
+        <p:style>
+          <a:lnRef idx="2">
+            <a:schemeClr val="accent1">
+              <a:shade val="50000"/>
+            </a:schemeClr>
+          </a:lnRef>
+          <a:fillRef idx="1">
+            <a:schemeClr val="accent1"/>
+          </a:fillRef>
+          <a:effectRef idx="0">
+            <a:schemeClr val="accent1"/>
+          </a:effectRef>
+          <a:fontRef idx="minor">
+            <a:schemeClr val="lt1"/>
+          </a:fontRef>
+        </p:style>
+        <p:txBody>
+          <a:bodyPr lIns="502920" tIns="91440"/>
+          <a:lstStyle/>
+          <a:p>
+            <a:pPr eaLnBrk="1" fontAlgn="auto" hangingPunct="1">
+              <a:spcBef>
+                <a:spcPts val="0"/>
+              </a:spcBef>
+              <a:spcAft>
+                <a:spcPts val="0"/>
+              </a:spcAft>
+              <a:defRPr/>
+            </a:pPr>
+            <a:r>
+              <a:rPr lang="en-US" sz="1200" dirty="0">
+                <a:solidFill>
+                  <a:srgbClr val="5B9CD5"/>
+                </a:solidFill>
+                <a:latin typeface="Arial" panose="020B0604020202020204" pitchFamily="34" charset="0"/>
+                <a:cs typeface="Arial" panose="020B0604020202020204" pitchFamily="34" charset="0"/>
+              </a:rPr>
+              <a:t>Global Region</a:t>
+            </a:r>
+          </a:p>
+        </p:txBody>
+      </p:sp>
+      <p:pic>
+        <p:nvPicPr>
+          <p:cNvPr id="91" name="Graphic 90">
+            <a:extLst>
+              <a:ext uri="{FF2B5EF4-FFF2-40B4-BE49-F238E27FC236}">
+                <a16:creationId xmlns:a16="http://schemas.microsoft.com/office/drawing/2014/main" id="{FB9E1E1B-57A0-4788-9819-50C02AC71C01}"/>
+              </a:ext>
+            </a:extLst>
+          </p:cNvPr>
+          <p:cNvPicPr>
+            <a:picLocks noChangeAspect="1"/>
+          </p:cNvPicPr>
+          <p:nvPr/>
+        </p:nvPicPr>
+        <p:blipFill>
+          <a:blip r:embed="rId13">
+            <a:extLst>
+              <a:ext uri="{96DAC541-7B7A-43D3-8B79-37D633B846F1}">
+                <asvg:svgBlip xmlns:asvg="http://schemas.microsoft.com/office/drawing/2016/SVG/main" r:embed="rId14"/>
+              </a:ext>
+            </a:extLst>
+          </a:blip>
+          <a:stretch>
+            <a:fillRect/>
+          </a:stretch>
+        </p:blipFill>
+        <p:spPr>
+          <a:xfrm>
+            <a:off x="1306408" y="4455830"/>
+            <a:ext cx="391567" cy="391567"/>
+          </a:xfrm>
+          <a:prstGeom prst="rect">
+            <a:avLst/>
+          </a:prstGeom>
+        </p:spPr>
+      </p:pic>
+      <p:sp>
+        <p:nvSpPr>
+          <p:cNvPr id="92" name="Rectangle 91">
+            <a:extLst>
+              <a:ext uri="{FF2B5EF4-FFF2-40B4-BE49-F238E27FC236}">
+                <a16:creationId xmlns:a16="http://schemas.microsoft.com/office/drawing/2014/main" id="{EB8EF509-86A7-4D3F-97C5-4161A0D7D5DC}"/>
+              </a:ext>
+            </a:extLst>
+          </p:cNvPr>
+          <p:cNvSpPr/>
+          <p:nvPr/>
+        </p:nvSpPr>
+        <p:spPr>
+          <a:xfrm>
+            <a:off x="7510314" y="1162291"/>
+            <a:ext cx="3201219" cy="3208614"/>
+          </a:xfrm>
+          <a:prstGeom prst="rect">
+            <a:avLst/>
+          </a:prstGeom>
+          <a:noFill/>
+          <a:ln w="12700">
+            <a:solidFill>
+              <a:srgbClr val="5B9CD5"/>
+            </a:solidFill>
+            <a:prstDash val="sysDash"/>
+          </a:ln>
+        </p:spPr>
+        <p:style>
+          <a:lnRef idx="2">
+            <a:schemeClr val="accent1">
+              <a:shade val="50000"/>
+            </a:schemeClr>
+          </a:lnRef>
+          <a:fillRef idx="1">
+            <a:schemeClr val="accent1"/>
+          </a:fillRef>
+          <a:effectRef idx="0">
+            <a:schemeClr val="accent1"/>
+          </a:effectRef>
+          <a:fontRef idx="minor">
+            <a:schemeClr val="lt1"/>
+          </a:fontRef>
+        </p:style>
+        <p:txBody>
+          <a:bodyPr lIns="502920" tIns="91440"/>
+          <a:lstStyle/>
+          <a:p>
+            <a:pPr eaLnBrk="1" fontAlgn="auto" hangingPunct="1">
+              <a:spcBef>
+                <a:spcPts val="0"/>
+              </a:spcBef>
+              <a:spcAft>
+                <a:spcPts val="0"/>
+              </a:spcAft>
+              <a:defRPr/>
+            </a:pPr>
+            <a:r>
+              <a:rPr lang="en-US" sz="1200" dirty="0">
+                <a:solidFill>
+                  <a:srgbClr val="5B9CD5"/>
+                </a:solidFill>
+                <a:latin typeface="Arial" panose="020B0604020202020204" pitchFamily="34" charset="0"/>
+                <a:cs typeface="Arial" panose="020B0604020202020204" pitchFamily="34" charset="0"/>
+              </a:rPr>
+              <a:t>Home Region</a:t>
+            </a:r>
+          </a:p>
+        </p:txBody>
+      </p:sp>
+      <p:pic>
+        <p:nvPicPr>
+          <p:cNvPr id="93" name="Graphic 92">
+            <a:extLst>
+              <a:ext uri="{FF2B5EF4-FFF2-40B4-BE49-F238E27FC236}">
+                <a16:creationId xmlns:a16="http://schemas.microsoft.com/office/drawing/2014/main" id="{EC084DFA-86C3-49C4-AA48-FCE7B244C08C}"/>
+              </a:ext>
+            </a:extLst>
+          </p:cNvPr>
+          <p:cNvPicPr>
+            <a:picLocks noChangeAspect="1"/>
+          </p:cNvPicPr>
+          <p:nvPr/>
+        </p:nvPicPr>
+        <p:blipFill>
+          <a:blip r:embed="rId13">
+            <a:extLst>
+              <a:ext uri="{96DAC541-7B7A-43D3-8B79-37D633B846F1}">
+                <asvg:svgBlip xmlns:asvg="http://schemas.microsoft.com/office/drawing/2016/SVG/main" r:embed="rId14"/>
+              </a:ext>
+            </a:extLst>
+          </a:blip>
+          <a:stretch>
+            <a:fillRect/>
+          </a:stretch>
+        </p:blipFill>
+        <p:spPr>
+          <a:xfrm>
+            <a:off x="7500244" y="1155797"/>
+            <a:ext cx="391567" cy="391567"/>
+          </a:xfrm>
+          <a:prstGeom prst="rect">
+            <a:avLst/>
+          </a:prstGeom>
+        </p:spPr>
+      </p:pic>
+      <p:sp>
+        <p:nvSpPr>
+          <p:cNvPr id="94" name="Rectangle 93">
+            <a:extLst>
+              <a:ext uri="{FF2B5EF4-FFF2-40B4-BE49-F238E27FC236}">
+                <a16:creationId xmlns:a16="http://schemas.microsoft.com/office/drawing/2014/main" id="{7AF6E144-58D8-43D4-B5AA-CE0A12BE713B}"/>
+              </a:ext>
+            </a:extLst>
+          </p:cNvPr>
+          <p:cNvSpPr/>
+          <p:nvPr/>
+        </p:nvSpPr>
+        <p:spPr>
+          <a:xfrm>
+            <a:off x="7135019" y="562687"/>
+            <a:ext cx="3701075" cy="5016846"/>
+          </a:xfrm>
+          <a:prstGeom prst="rect">
+            <a:avLst/>
+          </a:prstGeom>
+          <a:noFill/>
+          <a:ln w="12700">
+            <a:solidFill>
+              <a:srgbClr val="CD2264"/>
+            </a:solidFill>
+          </a:ln>
+        </p:spPr>
+        <p:style>
+          <a:lnRef idx="2">
+            <a:schemeClr val="accent1">
+              <a:shade val="50000"/>
+            </a:schemeClr>
+          </a:lnRef>
+          <a:fillRef idx="1">
+            <a:schemeClr val="accent1"/>
+          </a:fillRef>
+          <a:effectRef idx="0">
+            <a:schemeClr val="accent1"/>
+          </a:effectRef>
+          <a:fontRef idx="minor">
+            <a:schemeClr val="lt1"/>
+          </a:fontRef>
+        </p:style>
+        <p:txBody>
+          <a:bodyPr lIns="502920" tIns="91440"/>
+          <a:lstStyle/>
+          <a:p>
+            <a:pPr>
+              <a:defRPr/>
+            </a:pPr>
+            <a:r>
+              <a:rPr lang="en-US" sz="1200" dirty="0">
+                <a:solidFill>
+                  <a:srgbClr val="CD2264"/>
+                </a:solidFill>
+                <a:latin typeface="Arial" panose="020B0604020202020204" pitchFamily="34" charset="0"/>
+                <a:cs typeface="Arial" panose="020B0604020202020204" pitchFamily="34" charset="0"/>
+              </a:rPr>
+              <a:t>All Existing and Future Organization Member Accounts</a:t>
+            </a:r>
+          </a:p>
+        </p:txBody>
+      </p:sp>
+      <p:pic>
+        <p:nvPicPr>
+          <p:cNvPr id="95" name="Graphic 94">
+            <a:extLst>
+              <a:ext uri="{FF2B5EF4-FFF2-40B4-BE49-F238E27FC236}">
+                <a16:creationId xmlns:a16="http://schemas.microsoft.com/office/drawing/2014/main" id="{B39767F0-B9CD-447E-83A0-C7C6C28BE816}"/>
+              </a:ext>
+            </a:extLst>
+          </p:cNvPr>
+          <p:cNvPicPr>
+            <a:picLocks noChangeAspect="1"/>
+          </p:cNvPicPr>
+          <p:nvPr/>
+        </p:nvPicPr>
+        <p:blipFill>
+          <a:blip r:embed="rId15">
+            <a:extLst>
+              <a:ext uri="{96DAC541-7B7A-43D3-8B79-37D633B846F1}">
+                <asvg:svgBlip xmlns:asvg="http://schemas.microsoft.com/office/drawing/2016/SVG/main" r:embed="rId16"/>
+              </a:ext>
+            </a:extLst>
+          </a:blip>
+          <a:stretch>
+            <a:fillRect/>
+          </a:stretch>
+        </p:blipFill>
+        <p:spPr>
+          <a:xfrm>
+            <a:off x="7135020" y="559830"/>
+            <a:ext cx="381000" cy="381000"/>
+          </a:xfrm>
+          <a:prstGeom prst="rect">
+            <a:avLst/>
+          </a:prstGeom>
+        </p:spPr>
+      </p:pic>
+      <p:sp>
+        <p:nvSpPr>
+          <p:cNvPr id="96" name="Oval 95">
+            <a:extLst>
+              <a:ext uri="{FF2B5EF4-FFF2-40B4-BE49-F238E27FC236}">
+                <a16:creationId xmlns:a16="http://schemas.microsoft.com/office/drawing/2014/main" id="{0945CBA9-3016-48E5-B35A-8B97D9197D7A}"/>
+              </a:ext>
+            </a:extLst>
+          </p:cNvPr>
+          <p:cNvSpPr/>
+          <p:nvPr/>
+        </p:nvSpPr>
+        <p:spPr>
+          <a:xfrm>
+            <a:off x="7209768" y="900219"/>
+            <a:ext cx="253435" cy="212902"/>
+          </a:xfrm>
+          <a:prstGeom prst="ellipse">
+            <a:avLst/>
+          </a:prstGeom>
+          <a:solidFill>
+            <a:schemeClr val="tx1"/>
+          </a:solidFill>
+          <a:ln>
+            <a:solidFill>
+              <a:schemeClr val="tx1"/>
+            </a:solidFill>
+          </a:ln>
+        </p:spPr>
+        <p:style>
+          <a:lnRef idx="2">
+            <a:schemeClr val="accent1">
+              <a:shade val="50000"/>
+            </a:schemeClr>
+          </a:lnRef>
+          <a:fillRef idx="1">
+            <a:schemeClr val="accent1"/>
+          </a:fillRef>
+          <a:effectRef idx="0">
+            <a:schemeClr val="accent1"/>
+          </a:effectRef>
+          <a:fontRef idx="minor">
+            <a:schemeClr val="lt1"/>
+          </a:fontRef>
+        </p:style>
+        <p:txBody>
+          <a:bodyPr lIns="0" tIns="0" rIns="0" bIns="0" rtlCol="0" anchor="ctr"/>
+          <a:lstStyle/>
+          <a:p>
+            <a:pPr algn="ctr"/>
+            <a:r>
+              <a:rPr lang="en-US" sz="800" dirty="0">
+                <a:latin typeface="Arial" panose="020B0604020202020204" pitchFamily="34" charset="0"/>
+                <a:cs typeface="Arial" panose="020B0604020202020204" pitchFamily="34" charset="0"/>
+              </a:rPr>
+              <a:t>2.0</a:t>
+            </a:r>
+          </a:p>
+        </p:txBody>
+      </p:sp>
+      <p:sp>
+        <p:nvSpPr>
+          <p:cNvPr id="97" name="Rectangle 96">
+            <a:extLst>
+              <a:ext uri="{FF2B5EF4-FFF2-40B4-BE49-F238E27FC236}">
+                <a16:creationId xmlns:a16="http://schemas.microsoft.com/office/drawing/2014/main" id="{1B1E8EA0-A47D-432E-B531-B9E6692336F4}"/>
+              </a:ext>
+            </a:extLst>
+          </p:cNvPr>
+          <p:cNvSpPr/>
+          <p:nvPr/>
+        </p:nvSpPr>
+        <p:spPr>
+          <a:xfrm>
+            <a:off x="7510314" y="4462325"/>
+            <a:ext cx="3202638" cy="972968"/>
+          </a:xfrm>
+          <a:prstGeom prst="rect">
+            <a:avLst/>
+          </a:prstGeom>
+          <a:noFill/>
+          <a:ln w="12700">
+            <a:solidFill>
+              <a:srgbClr val="5B9CD5"/>
+            </a:solidFill>
+            <a:prstDash val="sysDash"/>
+          </a:ln>
+        </p:spPr>
+        <p:style>
+          <a:lnRef idx="2">
+            <a:schemeClr val="accent1">
+              <a:shade val="50000"/>
+            </a:schemeClr>
+          </a:lnRef>
+          <a:fillRef idx="1">
+            <a:schemeClr val="accent1"/>
+          </a:fillRef>
+          <a:effectRef idx="0">
+            <a:schemeClr val="accent1"/>
+          </a:effectRef>
+          <a:fontRef idx="minor">
+            <a:schemeClr val="lt1"/>
+          </a:fontRef>
+        </p:style>
+        <p:txBody>
+          <a:bodyPr lIns="502920" tIns="91440"/>
+          <a:lstStyle/>
+          <a:p>
+            <a:pPr eaLnBrk="1" fontAlgn="auto" hangingPunct="1">
+              <a:spcBef>
+                <a:spcPts val="0"/>
+              </a:spcBef>
+              <a:spcAft>
+                <a:spcPts val="0"/>
+              </a:spcAft>
+              <a:defRPr/>
+            </a:pPr>
+            <a:r>
+              <a:rPr lang="en-US" sz="1200" dirty="0">
+                <a:solidFill>
+                  <a:srgbClr val="5B9CD5"/>
+                </a:solidFill>
+                <a:latin typeface="Arial" panose="020B0604020202020204" pitchFamily="34" charset="0"/>
+                <a:cs typeface="Arial" panose="020B0604020202020204" pitchFamily="34" charset="0"/>
+              </a:rPr>
+              <a:t>Global Region</a:t>
+            </a:r>
+          </a:p>
+        </p:txBody>
+      </p:sp>
+      <p:pic>
+        <p:nvPicPr>
+          <p:cNvPr id="98" name="Graphic 97">
+            <a:extLst>
+              <a:ext uri="{FF2B5EF4-FFF2-40B4-BE49-F238E27FC236}">
+                <a16:creationId xmlns:a16="http://schemas.microsoft.com/office/drawing/2014/main" id="{AF6AE1CC-2D19-41BF-88AB-F6211DB76FCE}"/>
+              </a:ext>
+            </a:extLst>
+          </p:cNvPr>
+          <p:cNvPicPr>
+            <a:picLocks noChangeAspect="1"/>
+          </p:cNvPicPr>
+          <p:nvPr/>
+        </p:nvPicPr>
+        <p:blipFill>
+          <a:blip r:embed="rId13">
+            <a:extLst>
+              <a:ext uri="{96DAC541-7B7A-43D3-8B79-37D633B846F1}">
+                <asvg:svgBlip xmlns:asvg="http://schemas.microsoft.com/office/drawing/2016/SVG/main" r:embed="rId14"/>
+              </a:ext>
+            </a:extLst>
+          </a:blip>
+          <a:stretch>
+            <a:fillRect/>
+          </a:stretch>
+        </p:blipFill>
+        <p:spPr>
+          <a:xfrm>
+            <a:off x="7503009" y="4460626"/>
+            <a:ext cx="391567" cy="391567"/>
+          </a:xfrm>
+          <a:prstGeom prst="rect">
+            <a:avLst/>
+          </a:prstGeom>
+        </p:spPr>
+      </p:pic>
+      <p:sp>
+        <p:nvSpPr>
+          <p:cNvPr id="106" name="Oval 105">
+            <a:extLst>
+              <a:ext uri="{FF2B5EF4-FFF2-40B4-BE49-F238E27FC236}">
+                <a16:creationId xmlns:a16="http://schemas.microsoft.com/office/drawing/2014/main" id="{96812613-021F-47AE-9910-6504640DA4FE}"/>
+              </a:ext>
+            </a:extLst>
+          </p:cNvPr>
+          <p:cNvSpPr/>
+          <p:nvPr/>
+        </p:nvSpPr>
+        <p:spPr>
+          <a:xfrm>
+            <a:off x="969447" y="902455"/>
+            <a:ext cx="253435" cy="212902"/>
+          </a:xfrm>
+          <a:prstGeom prst="ellipse">
+            <a:avLst/>
+          </a:prstGeom>
+          <a:solidFill>
+            <a:schemeClr val="tx1"/>
+          </a:solidFill>
+          <a:ln>
+            <a:solidFill>
+              <a:schemeClr val="tx1"/>
+            </a:solidFill>
+          </a:ln>
+        </p:spPr>
+        <p:style>
+          <a:lnRef idx="2">
+            <a:schemeClr val="accent1">
+              <a:shade val="50000"/>
+            </a:schemeClr>
+          </a:lnRef>
+          <a:fillRef idx="1">
+            <a:schemeClr val="accent1"/>
+          </a:fillRef>
+          <a:effectRef idx="0">
+            <a:schemeClr val="accent1"/>
+          </a:effectRef>
+          <a:fontRef idx="minor">
+            <a:schemeClr val="lt1"/>
+          </a:fontRef>
+        </p:style>
+        <p:txBody>
+          <a:bodyPr lIns="0" tIns="0" rIns="0" bIns="0" rtlCol="0" anchor="ctr"/>
+          <a:lstStyle/>
+          <a:p>
+            <a:pPr algn="ctr"/>
+            <a:r>
+              <a:rPr lang="en-US" sz="800" dirty="0">
+                <a:latin typeface="Arial" panose="020B0604020202020204" pitchFamily="34" charset="0"/>
+                <a:cs typeface="Arial" panose="020B0604020202020204" pitchFamily="34" charset="0"/>
+              </a:rPr>
+              <a:t>1.0</a:t>
+            </a:r>
+          </a:p>
+        </p:txBody>
+      </p:sp>
     </p:spTree>
     <p:extLst>
       <p:ext uri="{BB962C8B-B14F-4D97-AF65-F5344CB8AC3E}">
-        <p14:creationId xmlns:p14="http://schemas.microsoft.com/office/powerpoint/2010/main" val="2296993975"/>
+        <p14:creationId xmlns:p14="http://schemas.microsoft.com/office/powerpoint/2010/main" val="1459805443"/>
       </p:ext>
     </p:extLst>
   </p:cSld>

</xml_diff>